<commit_message>
coding the mesos manage of delete function
</commit_message>
<xml_diff>
--- a/description/firecloud-architecture.pptx
+++ b/description/firecloud-architecture.pptx
@@ -9,6 +9,7 @@
     <p:sldId id="256" r:id="rId3"/>
     <p:sldId id="258" r:id="rId4"/>
     <p:sldId id="259" r:id="rId5"/>
+    <p:sldId id="260" r:id="rId6"/>
   </p:sldIdLst>
   <p:sldSz cx="9144000" cy="6858000" type="screen4x3"/>
   <p:notesSz cx="6858000" cy="9144000"/>
@@ -291,7 +292,7 @@
           <a:p>
             <a:fld id="{530820CF-B880-4189-942D-D702A7CBA730}" type="datetimeFigureOut">
               <a:rPr lang="zh-CN" altLang="en-US" smtClean="0"/>
-              <a:t>2018/11/4</a:t>
+              <a:t>2019/1/18</a:t>
             </a:fld>
             <a:endParaRPr lang="zh-CN" altLang="en-US"/>
           </a:p>
@@ -456,7 +457,7 @@
           <a:p>
             <a:fld id="{530820CF-B880-4189-942D-D702A7CBA730}" type="datetimeFigureOut">
               <a:rPr lang="zh-CN" altLang="en-US" smtClean="0"/>
-              <a:t>2018/11/4</a:t>
+              <a:t>2019/1/18</a:t>
             </a:fld>
             <a:endParaRPr lang="zh-CN" altLang="en-US"/>
           </a:p>
@@ -631,7 +632,7 @@
           <a:p>
             <a:fld id="{530820CF-B880-4189-942D-D702A7CBA730}" type="datetimeFigureOut">
               <a:rPr lang="zh-CN" altLang="en-US" smtClean="0"/>
-              <a:t>2018/11/4</a:t>
+              <a:t>2019/1/18</a:t>
             </a:fld>
             <a:endParaRPr lang="zh-CN" altLang="en-US"/>
           </a:p>
@@ -796,7 +797,7 @@
           <a:p>
             <a:fld id="{530820CF-B880-4189-942D-D702A7CBA730}" type="datetimeFigureOut">
               <a:rPr lang="zh-CN" altLang="en-US" smtClean="0"/>
-              <a:t>2018/11/4</a:t>
+              <a:t>2019/1/18</a:t>
             </a:fld>
             <a:endParaRPr lang="zh-CN" altLang="en-US"/>
           </a:p>
@@ -1037,7 +1038,7 @@
           <a:p>
             <a:fld id="{530820CF-B880-4189-942D-D702A7CBA730}" type="datetimeFigureOut">
               <a:rPr lang="zh-CN" altLang="en-US" smtClean="0"/>
-              <a:t>2018/11/4</a:t>
+              <a:t>2019/1/18</a:t>
             </a:fld>
             <a:endParaRPr lang="zh-CN" altLang="en-US"/>
           </a:p>
@@ -1320,7 +1321,7 @@
           <a:p>
             <a:fld id="{530820CF-B880-4189-942D-D702A7CBA730}" type="datetimeFigureOut">
               <a:rPr lang="zh-CN" altLang="en-US" smtClean="0"/>
-              <a:t>2018/11/4</a:t>
+              <a:t>2019/1/18</a:t>
             </a:fld>
             <a:endParaRPr lang="zh-CN" altLang="en-US"/>
           </a:p>
@@ -1737,7 +1738,7 @@
           <a:p>
             <a:fld id="{530820CF-B880-4189-942D-D702A7CBA730}" type="datetimeFigureOut">
               <a:rPr lang="zh-CN" altLang="en-US" smtClean="0"/>
-              <a:t>2018/11/4</a:t>
+              <a:t>2019/1/18</a:t>
             </a:fld>
             <a:endParaRPr lang="zh-CN" altLang="en-US"/>
           </a:p>
@@ -1850,7 +1851,7 @@
           <a:p>
             <a:fld id="{530820CF-B880-4189-942D-D702A7CBA730}" type="datetimeFigureOut">
               <a:rPr lang="zh-CN" altLang="en-US" smtClean="0"/>
-              <a:t>2018/11/4</a:t>
+              <a:t>2019/1/18</a:t>
             </a:fld>
             <a:endParaRPr lang="zh-CN" altLang="en-US"/>
           </a:p>
@@ -1940,7 +1941,7 @@
           <a:p>
             <a:fld id="{530820CF-B880-4189-942D-D702A7CBA730}" type="datetimeFigureOut">
               <a:rPr lang="zh-CN" altLang="en-US" smtClean="0"/>
-              <a:t>2018/11/4</a:t>
+              <a:t>2019/1/18</a:t>
             </a:fld>
             <a:endParaRPr lang="zh-CN" altLang="en-US"/>
           </a:p>
@@ -2212,7 +2213,7 @@
           <a:p>
             <a:fld id="{530820CF-B880-4189-942D-D702A7CBA730}" type="datetimeFigureOut">
               <a:rPr lang="zh-CN" altLang="en-US" smtClean="0"/>
-              <a:t>2018/11/4</a:t>
+              <a:t>2019/1/18</a:t>
             </a:fld>
             <a:endParaRPr lang="zh-CN" altLang="en-US"/>
           </a:p>
@@ -2460,7 +2461,7 @@
           <a:p>
             <a:fld id="{530820CF-B880-4189-942D-D702A7CBA730}" type="datetimeFigureOut">
               <a:rPr lang="zh-CN" altLang="en-US" smtClean="0"/>
-              <a:t>2018/11/4</a:t>
+              <a:t>2019/1/18</a:t>
             </a:fld>
             <a:endParaRPr lang="zh-CN" altLang="en-US"/>
           </a:p>
@@ -2668,7 +2669,7 @@
           <a:p>
             <a:fld id="{530820CF-B880-4189-942D-D702A7CBA730}" type="datetimeFigureOut">
               <a:rPr lang="zh-CN" altLang="en-US" smtClean="0"/>
-              <a:t>2018/11/4</a:t>
+              <a:t>2019/1/18</a:t>
             </a:fld>
             <a:endParaRPr lang="zh-CN" altLang="en-US"/>
           </a:p>
@@ -7028,6 +7029,333 @@
 </p:sld>
 </file>
 
+<file path=ppt/slides/slide5.xml><?xml version="1.0" encoding="utf-8"?>
+<p:sld xmlns:a="http://schemas.openxmlformats.org/drawingml/2006/main" xmlns:r="http://schemas.openxmlformats.org/officeDocument/2006/relationships" xmlns:p="http://schemas.openxmlformats.org/presentationml/2006/main">
+  <p:cSld>
+    <p:spTree>
+      <p:nvGrpSpPr>
+        <p:cNvPr id="1" name=""/>
+        <p:cNvGrpSpPr/>
+        <p:nvPr/>
+      </p:nvGrpSpPr>
+      <p:grpSpPr>
+        <a:xfrm>
+          <a:off x="0" y="0"/>
+          <a:ext cx="0" cy="0"/>
+          <a:chOff x="0" y="0"/>
+          <a:chExt cx="0" cy="0"/>
+        </a:xfrm>
+      </p:grpSpPr>
+      <p:sp>
+        <p:nvSpPr>
+          <p:cNvPr id="4" name="TextBox 3"/>
+          <p:cNvSpPr txBox="1"/>
+          <p:nvPr/>
+        </p:nvSpPr>
+        <p:spPr>
+          <a:xfrm>
+            <a:off x="2411760" y="201124"/>
+            <a:ext cx="3725635" cy="461665"/>
+          </a:xfrm>
+          <a:prstGeom prst="rect">
+            <a:avLst/>
+          </a:prstGeom>
+          <a:noFill/>
+        </p:spPr>
+        <p:txBody>
+          <a:bodyPr wrap="none" rtlCol="0">
+            <a:spAutoFit/>
+          </a:bodyPr>
+          <a:lstStyle/>
+          <a:p>
+            <a:r>
+              <a:rPr lang="en-US" altLang="zh-CN" sz="2400" b="1" dirty="0" err="1" smtClean="0"/>
+              <a:t>Mesos</a:t>
+            </a:r>
+            <a:r>
+              <a:rPr lang="en-US" altLang="zh-CN" sz="2400" b="1" dirty="0" smtClean="0"/>
+              <a:t> Cluster  Table Design</a:t>
+            </a:r>
+            <a:endParaRPr lang="zh-CN" altLang="en-US" sz="2400" b="1" dirty="0"/>
+          </a:p>
+        </p:txBody>
+      </p:sp>
+      <p:graphicFrame>
+        <p:nvGraphicFramePr>
+          <p:cNvPr id="5" name="表格 4"/>
+          <p:cNvGraphicFramePr>
+            <a:graphicFrameLocks noGrp="1"/>
+          </p:cNvGraphicFramePr>
+          <p:nvPr>
+            <p:extLst>
+              <p:ext uri="{D42A27DB-BD31-4B8C-83A1-F6EECF244321}">
+                <p14:modId xmlns:p14="http://schemas.microsoft.com/office/powerpoint/2010/main" val="2642279137"/>
+              </p:ext>
+            </p:extLst>
+          </p:nvPr>
+        </p:nvGraphicFramePr>
+        <p:xfrm>
+          <a:off x="323528" y="1052736"/>
+          <a:ext cx="8496944" cy="3010803"/>
+        </p:xfrm>
+        <a:graphic>
+          <a:graphicData uri="http://schemas.openxmlformats.org/drawingml/2006/table">
+            <a:tbl>
+              <a:tblPr firstRow="1" bandRow="1">
+                <a:tableStyleId>{5C22544A-7EE6-4342-B048-85BDC9FD1C3A}</a:tableStyleId>
+              </a:tblPr>
+              <a:tblGrid>
+                <a:gridCol w="2880320"/>
+                <a:gridCol w="5616624"/>
+              </a:tblGrid>
+              <a:tr h="434499">
+                <a:tc>
+                  <a:txBody>
+                    <a:bodyPr/>
+                    <a:lstStyle/>
+                    <a:p>
+                      <a:r>
+                        <a:rPr lang="en-US" altLang="zh-CN" dirty="0" smtClean="0"/>
+                        <a:t>Table  Name</a:t>
+                      </a:r>
+                      <a:endParaRPr lang="zh-CN" altLang="en-US" dirty="0"/>
+                    </a:p>
+                  </a:txBody>
+                  <a:tcPr/>
+                </a:tc>
+                <a:tc>
+                  <a:txBody>
+                    <a:bodyPr/>
+                    <a:lstStyle/>
+                    <a:p>
+                      <a:r>
+                        <a:rPr lang="en-US" altLang="zh-CN" dirty="0" smtClean="0"/>
+                        <a:t>Description</a:t>
+                      </a:r>
+                      <a:endParaRPr lang="zh-CN" altLang="en-US" dirty="0"/>
+                    </a:p>
+                  </a:txBody>
+                  <a:tcPr/>
+                </a:tc>
+              </a:tr>
+              <a:tr h="434499">
+                <a:tc>
+                  <a:txBody>
+                    <a:bodyPr/>
+                    <a:lstStyle/>
+                    <a:p>
+                      <a:r>
+                        <a:rPr lang="en-US" altLang="zh-CN" sz="1800" b="1" kern="1200" dirty="0" err="1" smtClean="0">
+                          <a:solidFill>
+                            <a:schemeClr val="dk1"/>
+                          </a:solidFill>
+                          <a:latin typeface="+mn-lt"/>
+                          <a:ea typeface="+mn-ea"/>
+                          <a:cs typeface="+mn-cs"/>
+                        </a:rPr>
+                        <a:t>PaasHost</a:t>
+                      </a:r>
+                      <a:endParaRPr lang="zh-CN" altLang="en-US" dirty="0"/>
+                    </a:p>
+                  </a:txBody>
+                  <a:tcPr/>
+                </a:tc>
+                <a:tc>
+                  <a:txBody>
+                    <a:bodyPr/>
+                    <a:lstStyle/>
+                    <a:p>
+                      <a:r>
+                        <a:rPr lang="zh-CN" altLang="en-US" dirty="0" smtClean="0"/>
+                        <a:t>空闲主机表</a:t>
+                      </a:r>
+                      <a:endParaRPr lang="zh-CN" altLang="en-US" dirty="0"/>
+                    </a:p>
+                  </a:txBody>
+                  <a:tcPr/>
+                </a:tc>
+              </a:tr>
+              <a:tr h="427146">
+                <a:tc>
+                  <a:txBody>
+                    <a:bodyPr/>
+                    <a:lstStyle/>
+                    <a:p>
+                      <a:r>
+                        <a:rPr lang="en-US" altLang="zh-CN" sz="1800" b="1" kern="1200" dirty="0" err="1" smtClean="0">
+                          <a:solidFill>
+                            <a:schemeClr val="dk1"/>
+                          </a:solidFill>
+                          <a:latin typeface="+mn-lt"/>
+                          <a:ea typeface="+mn-ea"/>
+                          <a:cs typeface="+mn-cs"/>
+                        </a:rPr>
+                        <a:t>MesosCluster</a:t>
+                      </a:r>
+                      <a:endParaRPr lang="zh-CN" altLang="en-US" dirty="0"/>
+                    </a:p>
+                  </a:txBody>
+                  <a:tcPr/>
+                </a:tc>
+                <a:tc>
+                  <a:txBody>
+                    <a:bodyPr/>
+                    <a:lstStyle/>
+                    <a:p>
+                      <a:r>
+                        <a:rPr lang="zh-CN" altLang="en-US" dirty="0" smtClean="0"/>
+                        <a:t>集群基本配置，部署状态</a:t>
+                      </a:r>
+                      <a:endParaRPr lang="zh-CN" altLang="en-US" dirty="0"/>
+                    </a:p>
+                  </a:txBody>
+                  <a:tcPr/>
+                </a:tc>
+              </a:tr>
+              <a:tr h="434499">
+                <a:tc>
+                  <a:txBody>
+                    <a:bodyPr/>
+                    <a:lstStyle/>
+                    <a:p>
+                      <a:r>
+                        <a:rPr lang="en-US" altLang="zh-CN" sz="1800" b="1" kern="1200" dirty="0" err="1" smtClean="0">
+                          <a:solidFill>
+                            <a:schemeClr val="dk1"/>
+                          </a:solidFill>
+                          <a:latin typeface="+mn-lt"/>
+                          <a:ea typeface="+mn-ea"/>
+                          <a:cs typeface="+mn-cs"/>
+                        </a:rPr>
+                        <a:t>MesosDeployLog</a:t>
+                      </a:r>
+                      <a:endParaRPr lang="zh-CN" altLang="en-US" dirty="0"/>
+                    </a:p>
+                  </a:txBody>
+                  <a:tcPr/>
+                </a:tc>
+                <a:tc>
+                  <a:txBody>
+                    <a:bodyPr/>
+                    <a:lstStyle/>
+                    <a:p>
+                      <a:r>
+                        <a:rPr lang="zh-CN" altLang="en-US" dirty="0" smtClean="0"/>
+                        <a:t>集群部署日志</a:t>
+                      </a:r>
+                      <a:endParaRPr lang="zh-CN" altLang="en-US" dirty="0"/>
+                    </a:p>
+                  </a:txBody>
+                  <a:tcPr/>
+                </a:tc>
+              </a:tr>
+              <a:tr h="429597">
+                <a:tc>
+                  <a:txBody>
+                    <a:bodyPr/>
+                    <a:lstStyle/>
+                    <a:p>
+                      <a:r>
+                        <a:rPr lang="en-US" altLang="zh-CN" sz="1800" b="1" kern="1200" dirty="0" err="1" smtClean="0">
+                          <a:solidFill>
+                            <a:schemeClr val="dk1"/>
+                          </a:solidFill>
+                          <a:latin typeface="+mn-lt"/>
+                          <a:ea typeface="+mn-ea"/>
+                          <a:cs typeface="+mn-cs"/>
+                        </a:rPr>
+                        <a:t>MesosClusterOverview</a:t>
+                      </a:r>
+                      <a:endParaRPr lang="zh-CN" altLang="en-US" dirty="0"/>
+                    </a:p>
+                  </a:txBody>
+                  <a:tcPr/>
+                </a:tc>
+                <a:tc>
+                  <a:txBody>
+                    <a:bodyPr/>
+                    <a:lstStyle/>
+                    <a:p>
+                      <a:r>
+                        <a:rPr lang="zh-CN" altLang="en-US" dirty="0" smtClean="0"/>
+                        <a:t>集群运行概览（集群</a:t>
+                      </a:r>
+                      <a:r>
+                        <a:rPr lang="en-US" altLang="zh-CN" dirty="0" smtClean="0"/>
+                        <a:t>CPU</a:t>
+                      </a:r>
+                      <a:r>
+                        <a:rPr lang="zh-CN" altLang="en-US" dirty="0" smtClean="0"/>
+                        <a:t>，内存，磁盘，</a:t>
+                      </a:r>
+                      <a:r>
+                        <a:rPr lang="en-US" altLang="zh-CN" dirty="0" smtClean="0"/>
+                        <a:t>master leader, </a:t>
+                      </a:r>
+                      <a:r>
+                        <a:rPr lang="zh-CN" altLang="en-US" dirty="0" smtClean="0"/>
+                        <a:t>集群运行总容器数，各组件状态）</a:t>
+                      </a:r>
+                      <a:endParaRPr lang="zh-CN" altLang="en-US" dirty="0"/>
+                    </a:p>
+                  </a:txBody>
+                  <a:tcPr/>
+                </a:tc>
+              </a:tr>
+              <a:tr h="434499">
+                <a:tc>
+                  <a:txBody>
+                    <a:bodyPr/>
+                    <a:lstStyle/>
+                    <a:p>
+                      <a:r>
+                        <a:rPr lang="en-US" altLang="zh-CN" sz="1800" b="1" kern="1200" dirty="0" err="1" smtClean="0">
+                          <a:solidFill>
+                            <a:schemeClr val="dk1"/>
+                          </a:solidFill>
+                          <a:latin typeface="+mn-lt"/>
+                          <a:ea typeface="+mn-ea"/>
+                          <a:cs typeface="+mn-cs"/>
+                        </a:rPr>
+                        <a:t>MesosClusterDetail</a:t>
+                      </a:r>
+                      <a:endParaRPr lang="zh-CN" altLang="en-US" dirty="0"/>
+                    </a:p>
+                  </a:txBody>
+                  <a:tcPr/>
+                </a:tc>
+                <a:tc>
+                  <a:txBody>
+                    <a:bodyPr/>
+                    <a:lstStyle/>
+                    <a:p>
+                      <a:r>
+                        <a:rPr lang="zh-CN" altLang="en-US" dirty="0" smtClean="0"/>
+                        <a:t>集群各组件下的具体节点情况（容器运行情况，服务运行情况）</a:t>
+                      </a:r>
+                      <a:endParaRPr lang="zh-CN" altLang="en-US" dirty="0"/>
+                    </a:p>
+                  </a:txBody>
+                  <a:tcPr/>
+                </a:tc>
+              </a:tr>
+            </a:tbl>
+          </a:graphicData>
+        </a:graphic>
+      </p:graphicFrame>
+    </p:spTree>
+    <p:extLst>
+      <p:ext uri="{BB962C8B-B14F-4D97-AF65-F5344CB8AC3E}">
+        <p14:creationId xmlns:p14="http://schemas.microsoft.com/office/powerpoint/2010/main" val="3709135449"/>
+      </p:ext>
+    </p:extLst>
+  </p:cSld>
+  <p:clrMapOvr>
+    <a:masterClrMapping/>
+  </p:clrMapOvr>
+</p:sld>
+</file>
+
 <file path=ppt/theme/theme1.xml><?xml version="1.0" encoding="utf-8"?>
 <a:theme xmlns:a="http://schemas.openxmlformats.org/drawingml/2006/main" name="Office 主题">
   <a:themeElements>

</xml_diff>

<commit_message>
coding the mesos cluster manage of start,stop,logs function
</commit_message>
<xml_diff>
--- a/description/firecloud-architecture.pptx
+++ b/description/firecloud-architecture.pptx
@@ -10,6 +10,9 @@
     <p:sldId id="258" r:id="rId4"/>
     <p:sldId id="259" r:id="rId5"/>
     <p:sldId id="260" r:id="rId6"/>
+    <p:sldId id="261" r:id="rId7"/>
+    <p:sldId id="263" r:id="rId8"/>
+    <p:sldId id="262" r:id="rId9"/>
   </p:sldIdLst>
   <p:sldSz cx="9144000" cy="6858000" type="screen4x3"/>
   <p:notesSz cx="6858000" cy="9144000"/>
@@ -292,7 +295,7 @@
           <a:p>
             <a:fld id="{530820CF-B880-4189-942D-D702A7CBA730}" type="datetimeFigureOut">
               <a:rPr lang="zh-CN" altLang="en-US" smtClean="0"/>
-              <a:t>2019/1/18</a:t>
+              <a:t>2019/1/19</a:t>
             </a:fld>
             <a:endParaRPr lang="zh-CN" altLang="en-US"/>
           </a:p>
@@ -457,7 +460,7 @@
           <a:p>
             <a:fld id="{530820CF-B880-4189-942D-D702A7CBA730}" type="datetimeFigureOut">
               <a:rPr lang="zh-CN" altLang="en-US" smtClean="0"/>
-              <a:t>2019/1/18</a:t>
+              <a:t>2019/1/19</a:t>
             </a:fld>
             <a:endParaRPr lang="zh-CN" altLang="en-US"/>
           </a:p>
@@ -632,7 +635,7 @@
           <a:p>
             <a:fld id="{530820CF-B880-4189-942D-D702A7CBA730}" type="datetimeFigureOut">
               <a:rPr lang="zh-CN" altLang="en-US" smtClean="0"/>
-              <a:t>2019/1/18</a:t>
+              <a:t>2019/1/19</a:t>
             </a:fld>
             <a:endParaRPr lang="zh-CN" altLang="en-US"/>
           </a:p>
@@ -797,7 +800,7 @@
           <a:p>
             <a:fld id="{530820CF-B880-4189-942D-D702A7CBA730}" type="datetimeFigureOut">
               <a:rPr lang="zh-CN" altLang="en-US" smtClean="0"/>
-              <a:t>2019/1/18</a:t>
+              <a:t>2019/1/19</a:t>
             </a:fld>
             <a:endParaRPr lang="zh-CN" altLang="en-US"/>
           </a:p>
@@ -1038,7 +1041,7 @@
           <a:p>
             <a:fld id="{530820CF-B880-4189-942D-D702A7CBA730}" type="datetimeFigureOut">
               <a:rPr lang="zh-CN" altLang="en-US" smtClean="0"/>
-              <a:t>2019/1/18</a:t>
+              <a:t>2019/1/19</a:t>
             </a:fld>
             <a:endParaRPr lang="zh-CN" altLang="en-US"/>
           </a:p>
@@ -1321,7 +1324,7 @@
           <a:p>
             <a:fld id="{530820CF-B880-4189-942D-D702A7CBA730}" type="datetimeFigureOut">
               <a:rPr lang="zh-CN" altLang="en-US" smtClean="0"/>
-              <a:t>2019/1/18</a:t>
+              <a:t>2019/1/19</a:t>
             </a:fld>
             <a:endParaRPr lang="zh-CN" altLang="en-US"/>
           </a:p>
@@ -1738,7 +1741,7 @@
           <a:p>
             <a:fld id="{530820CF-B880-4189-942D-D702A7CBA730}" type="datetimeFigureOut">
               <a:rPr lang="zh-CN" altLang="en-US" smtClean="0"/>
-              <a:t>2019/1/18</a:t>
+              <a:t>2019/1/19</a:t>
             </a:fld>
             <a:endParaRPr lang="zh-CN" altLang="en-US"/>
           </a:p>
@@ -1851,7 +1854,7 @@
           <a:p>
             <a:fld id="{530820CF-B880-4189-942D-D702A7CBA730}" type="datetimeFigureOut">
               <a:rPr lang="zh-CN" altLang="en-US" smtClean="0"/>
-              <a:t>2019/1/18</a:t>
+              <a:t>2019/1/19</a:t>
             </a:fld>
             <a:endParaRPr lang="zh-CN" altLang="en-US"/>
           </a:p>
@@ -1941,7 +1944,7 @@
           <a:p>
             <a:fld id="{530820CF-B880-4189-942D-D702A7CBA730}" type="datetimeFigureOut">
               <a:rPr lang="zh-CN" altLang="en-US" smtClean="0"/>
-              <a:t>2019/1/18</a:t>
+              <a:t>2019/1/19</a:t>
             </a:fld>
             <a:endParaRPr lang="zh-CN" altLang="en-US"/>
           </a:p>
@@ -2213,7 +2216,7 @@
           <a:p>
             <a:fld id="{530820CF-B880-4189-942D-D702A7CBA730}" type="datetimeFigureOut">
               <a:rPr lang="zh-CN" altLang="en-US" smtClean="0"/>
-              <a:t>2019/1/18</a:t>
+              <a:t>2019/1/19</a:t>
             </a:fld>
             <a:endParaRPr lang="zh-CN" altLang="en-US"/>
           </a:p>
@@ -2461,7 +2464,7 @@
           <a:p>
             <a:fld id="{530820CF-B880-4189-942D-D702A7CBA730}" type="datetimeFigureOut">
               <a:rPr lang="zh-CN" altLang="en-US" smtClean="0"/>
-              <a:t>2019/1/18</a:t>
+              <a:t>2019/1/19</a:t>
             </a:fld>
             <a:endParaRPr lang="zh-CN" altLang="en-US"/>
           </a:p>
@@ -2669,7 +2672,7 @@
           <a:p>
             <a:fld id="{530820CF-B880-4189-942D-D702A7CBA730}" type="datetimeFigureOut">
               <a:rPr lang="zh-CN" altLang="en-US" smtClean="0"/>
-              <a:t>2019/1/18</a:t>
+              <a:t>2019/1/19</a:t>
             </a:fld>
             <a:endParaRPr lang="zh-CN" altLang="en-US"/>
           </a:p>
@@ -7356,6 +7359,1981 @@
 </p:sld>
 </file>
 
+<file path=ppt/slides/slide6.xml><?xml version="1.0" encoding="utf-8"?>
+<p:sld xmlns:a="http://schemas.openxmlformats.org/drawingml/2006/main" xmlns:r="http://schemas.openxmlformats.org/officeDocument/2006/relationships" xmlns:p="http://schemas.openxmlformats.org/presentationml/2006/main">
+  <p:cSld>
+    <p:spTree>
+      <p:nvGrpSpPr>
+        <p:cNvPr id="1" name=""/>
+        <p:cNvGrpSpPr/>
+        <p:nvPr/>
+      </p:nvGrpSpPr>
+      <p:grpSpPr>
+        <a:xfrm>
+          <a:off x="0" y="0"/>
+          <a:ext cx="0" cy="0"/>
+          <a:chOff x="0" y="0"/>
+          <a:chExt cx="0" cy="0"/>
+        </a:xfrm>
+      </p:grpSpPr>
+      <p:sp>
+        <p:nvSpPr>
+          <p:cNvPr id="4" name="TextBox 3"/>
+          <p:cNvSpPr txBox="1"/>
+          <p:nvPr/>
+        </p:nvSpPr>
+        <p:spPr>
+          <a:xfrm>
+            <a:off x="2195736" y="476672"/>
+            <a:ext cx="4873450" cy="523220"/>
+          </a:xfrm>
+          <a:prstGeom prst="rect">
+            <a:avLst/>
+          </a:prstGeom>
+          <a:noFill/>
+        </p:spPr>
+        <p:txBody>
+          <a:bodyPr wrap="none" rtlCol="0">
+            <a:spAutoFit/>
+          </a:bodyPr>
+          <a:lstStyle/>
+          <a:p>
+            <a:r>
+              <a:rPr lang="zh-CN" altLang="en-US" sz="2800" b="1" dirty="0" smtClean="0"/>
+              <a:t>私有云容器类虚拟机管理设计</a:t>
+            </a:r>
+            <a:endParaRPr lang="zh-CN" altLang="en-US" sz="2800" b="1" dirty="0"/>
+          </a:p>
+        </p:txBody>
+      </p:sp>
+      <p:sp>
+        <p:nvSpPr>
+          <p:cNvPr id="5" name="TextBox 4"/>
+          <p:cNvSpPr txBox="1"/>
+          <p:nvPr/>
+        </p:nvSpPr>
+        <p:spPr>
+          <a:xfrm>
+            <a:off x="683568" y="1628800"/>
+            <a:ext cx="8160504" cy="3416320"/>
+          </a:xfrm>
+          <a:prstGeom prst="rect">
+            <a:avLst/>
+          </a:prstGeom>
+          <a:noFill/>
+        </p:spPr>
+        <p:txBody>
+          <a:bodyPr wrap="none" rtlCol="0">
+            <a:spAutoFit/>
+          </a:bodyPr>
+          <a:lstStyle/>
+          <a:p>
+            <a:r>
+              <a:rPr lang="zh-CN" altLang="en-US" dirty="0" smtClean="0"/>
+              <a:t>无论是</a:t>
+            </a:r>
+            <a:r>
+              <a:rPr lang="en-US" altLang="zh-CN" dirty="0" err="1" smtClean="0"/>
+              <a:t>mesos</a:t>
+            </a:r>
+            <a:r>
+              <a:rPr lang="en-US" altLang="zh-CN" dirty="0" smtClean="0"/>
+              <a:t> + marathon </a:t>
+            </a:r>
+            <a:r>
+              <a:rPr lang="zh-CN" altLang="en-US" dirty="0" smtClean="0"/>
+              <a:t>还是  </a:t>
+            </a:r>
+            <a:r>
+              <a:rPr lang="en-US" altLang="zh-CN" dirty="0" err="1" smtClean="0"/>
+              <a:t>kubernetes</a:t>
+            </a:r>
+            <a:r>
+              <a:rPr lang="en-US" altLang="zh-CN" dirty="0" smtClean="0"/>
+              <a:t> </a:t>
+            </a:r>
+            <a:r>
+              <a:rPr lang="zh-CN" altLang="en-US" dirty="0" smtClean="0"/>
+              <a:t>容器编排平台，都有</a:t>
+            </a:r>
+            <a:r>
+              <a:rPr lang="en-US" altLang="zh-CN" dirty="0" smtClean="0"/>
+              <a:t>2</a:t>
+            </a:r>
+            <a:r>
+              <a:rPr lang="zh-CN" altLang="en-US" dirty="0" smtClean="0"/>
+              <a:t>个显著的问题：</a:t>
+            </a:r>
+            <a:endParaRPr lang="en-US" altLang="zh-CN" dirty="0" smtClean="0"/>
+          </a:p>
+          <a:p>
+            <a:pPr marL="342900" indent="-342900">
+              <a:buFont typeface="Wingdings" pitchFamily="2" charset="2"/>
+              <a:buChar char="l"/>
+            </a:pPr>
+            <a:r>
+              <a:rPr lang="zh-CN" altLang="en-US" dirty="0" smtClean="0"/>
+              <a:t>不能指定容器运行在指定主机上，只支持运行在指定资源池上</a:t>
+            </a:r>
+            <a:endParaRPr lang="en-US" altLang="zh-CN" dirty="0" smtClean="0"/>
+          </a:p>
+          <a:p>
+            <a:pPr marL="342900" indent="-342900">
+              <a:buFont typeface="Wingdings" pitchFamily="2" charset="2"/>
+              <a:buChar char="l"/>
+            </a:pPr>
+            <a:endParaRPr lang="en-US" altLang="zh-CN" dirty="0" smtClean="0"/>
+          </a:p>
+          <a:p>
+            <a:pPr marL="342900" indent="-342900">
+              <a:buFont typeface="Wingdings" pitchFamily="2" charset="2"/>
+              <a:buChar char="l"/>
+            </a:pPr>
+            <a:r>
+              <a:rPr lang="zh-CN" altLang="en-US" dirty="0" smtClean="0"/>
+              <a:t>创建的容器命名问题，都是使用随机</a:t>
+            </a:r>
+            <a:r>
+              <a:rPr lang="en-US" altLang="zh-CN" dirty="0" smtClean="0"/>
+              <a:t>ID</a:t>
+            </a:r>
+            <a:r>
+              <a:rPr lang="zh-CN" altLang="en-US" dirty="0" smtClean="0"/>
+              <a:t>，虽然避免了容器名的重复性，</a:t>
+            </a:r>
+            <a:endParaRPr lang="en-US" altLang="zh-CN" dirty="0" smtClean="0"/>
+          </a:p>
+          <a:p>
+            <a:r>
+              <a:rPr lang="en-US" altLang="zh-CN" dirty="0"/>
+              <a:t> </a:t>
+            </a:r>
+            <a:r>
+              <a:rPr lang="en-US" altLang="zh-CN" dirty="0" smtClean="0"/>
+              <a:t>       </a:t>
+            </a:r>
+            <a:r>
+              <a:rPr lang="zh-CN" altLang="en-US" dirty="0" smtClean="0"/>
+              <a:t>但是在私有云平台上，管理起来就不能见名知意</a:t>
+            </a:r>
+            <a:endParaRPr lang="en-US" altLang="zh-CN" dirty="0" smtClean="0"/>
+          </a:p>
+          <a:p>
+            <a:endParaRPr lang="en-US" altLang="zh-CN" dirty="0"/>
+          </a:p>
+          <a:p>
+            <a:pPr marL="285750" indent="-285750">
+              <a:buFont typeface="Wingdings" pitchFamily="2" charset="2"/>
+              <a:buChar char="l"/>
+            </a:pPr>
+            <a:r>
+              <a:rPr lang="zh-CN" altLang="en-US" dirty="0" smtClean="0"/>
+              <a:t>在日志管理上，如果一个主机上一个应用有多个实例，那么日志必须用 </a:t>
+            </a:r>
+            <a:endParaRPr lang="en-US" altLang="zh-CN" dirty="0" smtClean="0"/>
+          </a:p>
+          <a:p>
+            <a:r>
+              <a:rPr lang="en-US" altLang="zh-CN" dirty="0" smtClean="0"/>
+              <a:t>       container ID</a:t>
+            </a:r>
+            <a:r>
+              <a:rPr lang="zh-CN" altLang="en-US" dirty="0" smtClean="0"/>
+              <a:t>来唯一区分，如果可以，尽量使用容器名区分，</a:t>
+            </a:r>
+            <a:endParaRPr lang="en-US" altLang="zh-CN" dirty="0" smtClean="0"/>
+          </a:p>
+          <a:p>
+            <a:r>
+              <a:rPr lang="en-US" altLang="zh-CN" dirty="0"/>
+              <a:t> </a:t>
+            </a:r>
+            <a:r>
+              <a:rPr lang="zh-CN" altLang="en-US" dirty="0" smtClean="0"/>
+              <a:t>如一个 </a:t>
+            </a:r>
+            <a:r>
+              <a:rPr lang="en-US" altLang="zh-CN" dirty="0" smtClean="0"/>
+              <a:t>firecloud</a:t>
+            </a:r>
+            <a:r>
+              <a:rPr lang="zh-CN" altLang="en-US" dirty="0" smtClean="0"/>
+              <a:t>应用，在</a:t>
+            </a:r>
+            <a:r>
+              <a:rPr lang="en-US" altLang="zh-CN" dirty="0" smtClean="0"/>
+              <a:t>A</a:t>
+            </a:r>
+            <a:r>
+              <a:rPr lang="zh-CN" altLang="en-US" dirty="0" smtClean="0"/>
+              <a:t>机器上有</a:t>
+            </a:r>
+            <a:r>
+              <a:rPr lang="en-US" altLang="zh-CN" dirty="0" smtClean="0"/>
+              <a:t>3</a:t>
+            </a:r>
+            <a:r>
+              <a:rPr lang="zh-CN" altLang="en-US" dirty="0" smtClean="0"/>
+              <a:t>个实例，容器名分别为</a:t>
+            </a:r>
+            <a:r>
+              <a:rPr lang="en-US" altLang="zh-CN" dirty="0" smtClean="0"/>
+              <a:t>:</a:t>
+            </a:r>
+          </a:p>
+          <a:p>
+            <a:r>
+              <a:rPr lang="en-US" altLang="zh-CN" dirty="0"/>
+              <a:t> </a:t>
+            </a:r>
+            <a:r>
+              <a:rPr lang="en-US" altLang="zh-CN" dirty="0" smtClean="0"/>
+              <a:t>firecloud01, </a:t>
+            </a:r>
+          </a:p>
+          <a:p>
+            <a:r>
+              <a:rPr lang="en-US" altLang="zh-CN" dirty="0" smtClean="0"/>
+              <a:t> firecloud02,</a:t>
+            </a:r>
+          </a:p>
+          <a:p>
+            <a:r>
+              <a:rPr lang="en-US" altLang="zh-CN" dirty="0"/>
+              <a:t> </a:t>
+            </a:r>
+            <a:r>
+              <a:rPr lang="en-US" altLang="zh-CN" dirty="0" smtClean="0"/>
+              <a:t>firecloud03,</a:t>
+            </a:r>
+            <a:endParaRPr lang="zh-CN" altLang="en-US" dirty="0"/>
+          </a:p>
+        </p:txBody>
+      </p:sp>
+    </p:spTree>
+    <p:extLst>
+      <p:ext uri="{BB962C8B-B14F-4D97-AF65-F5344CB8AC3E}">
+        <p14:creationId xmlns:p14="http://schemas.microsoft.com/office/powerpoint/2010/main" val="2454566483"/>
+      </p:ext>
+    </p:extLst>
+  </p:cSld>
+  <p:clrMapOvr>
+    <a:masterClrMapping/>
+  </p:clrMapOvr>
+</p:sld>
+</file>
+
+<file path=ppt/slides/slide7.xml><?xml version="1.0" encoding="utf-8"?>
+<p:sld xmlns:a="http://schemas.openxmlformats.org/drawingml/2006/main" xmlns:r="http://schemas.openxmlformats.org/officeDocument/2006/relationships" xmlns:p="http://schemas.openxmlformats.org/presentationml/2006/main">
+  <p:cSld>
+    <p:spTree>
+      <p:nvGrpSpPr>
+        <p:cNvPr id="1" name=""/>
+        <p:cNvGrpSpPr/>
+        <p:nvPr/>
+      </p:nvGrpSpPr>
+      <p:grpSpPr>
+        <a:xfrm>
+          <a:off x="0" y="0"/>
+          <a:ext cx="0" cy="0"/>
+          <a:chOff x="0" y="0"/>
+          <a:chExt cx="0" cy="0"/>
+        </a:xfrm>
+      </p:grpSpPr>
+      <p:sp>
+        <p:nvSpPr>
+          <p:cNvPr id="18" name="矩形 17"/>
+          <p:cNvSpPr/>
+          <p:nvPr/>
+        </p:nvSpPr>
+        <p:spPr>
+          <a:xfrm>
+            <a:off x="216024" y="548680"/>
+            <a:ext cx="8676456" cy="2717140"/>
+          </a:xfrm>
+          <a:prstGeom prst="rect">
+            <a:avLst/>
+          </a:prstGeom>
+          <a:solidFill>
+            <a:schemeClr val="bg1"/>
+          </a:solidFill>
+        </p:spPr>
+        <p:style>
+          <a:lnRef idx="2">
+            <a:schemeClr val="accent1">
+              <a:shade val="50000"/>
+            </a:schemeClr>
+          </a:lnRef>
+          <a:fillRef idx="1">
+            <a:schemeClr val="accent1"/>
+          </a:fillRef>
+          <a:effectRef idx="0">
+            <a:schemeClr val="accent1"/>
+          </a:effectRef>
+          <a:fontRef idx="minor">
+            <a:schemeClr val="lt1"/>
+          </a:fontRef>
+        </p:style>
+        <p:txBody>
+          <a:bodyPr rtlCol="0" anchor="ctr"/>
+          <a:lstStyle/>
+          <a:p>
+            <a:pPr algn="ctr"/>
+            <a:endParaRPr lang="zh-CN" altLang="en-US" dirty="0"/>
+          </a:p>
+        </p:txBody>
+      </p:sp>
+      <p:sp>
+        <p:nvSpPr>
+          <p:cNvPr id="4" name="TextBox 3"/>
+          <p:cNvSpPr txBox="1"/>
+          <p:nvPr/>
+        </p:nvSpPr>
+        <p:spPr>
+          <a:xfrm>
+            <a:off x="2013986" y="0"/>
+            <a:ext cx="4873450" cy="523220"/>
+          </a:xfrm>
+          <a:prstGeom prst="rect">
+            <a:avLst/>
+          </a:prstGeom>
+          <a:noFill/>
+        </p:spPr>
+        <p:txBody>
+          <a:bodyPr wrap="none" rtlCol="0">
+            <a:spAutoFit/>
+          </a:bodyPr>
+          <a:lstStyle/>
+          <a:p>
+            <a:r>
+              <a:rPr lang="zh-CN" altLang="en-US" sz="2800" b="1" dirty="0" smtClean="0"/>
+              <a:t>私有云容器类虚拟机管理设计</a:t>
+            </a:r>
+            <a:endParaRPr lang="zh-CN" altLang="en-US" sz="2800" b="1" dirty="0"/>
+          </a:p>
+        </p:txBody>
+      </p:sp>
+      <p:sp>
+        <p:nvSpPr>
+          <p:cNvPr id="3" name="流程图: 磁盘 2"/>
+          <p:cNvSpPr/>
+          <p:nvPr/>
+        </p:nvSpPr>
+        <p:spPr>
+          <a:xfrm>
+            <a:off x="7658520" y="894421"/>
+            <a:ext cx="1152128" cy="1152128"/>
+          </a:xfrm>
+          <a:prstGeom prst="flowChartMagneticDisk">
+            <a:avLst/>
+          </a:prstGeom>
+        </p:spPr>
+        <p:style>
+          <a:lnRef idx="2">
+            <a:schemeClr val="accent1">
+              <a:shade val="50000"/>
+            </a:schemeClr>
+          </a:lnRef>
+          <a:fillRef idx="1">
+            <a:schemeClr val="accent1"/>
+          </a:fillRef>
+          <a:effectRef idx="0">
+            <a:schemeClr val="accent1"/>
+          </a:effectRef>
+          <a:fontRef idx="minor">
+            <a:schemeClr val="lt1"/>
+          </a:fontRef>
+        </p:style>
+        <p:txBody>
+          <a:bodyPr rtlCol="0" anchor="ctr"/>
+          <a:lstStyle/>
+          <a:p>
+            <a:pPr algn="ctr"/>
+            <a:r>
+              <a:rPr lang="zh-CN" altLang="en-US" dirty="0"/>
+              <a:t>数据库</a:t>
+            </a:r>
+          </a:p>
+        </p:txBody>
+      </p:sp>
+      <p:sp>
+        <p:nvSpPr>
+          <p:cNvPr id="7" name="菱形 6"/>
+          <p:cNvSpPr/>
+          <p:nvPr/>
+        </p:nvSpPr>
+        <p:spPr>
+          <a:xfrm>
+            <a:off x="3059832" y="3841884"/>
+            <a:ext cx="2232248" cy="864096"/>
+          </a:xfrm>
+          <a:prstGeom prst="diamond">
+            <a:avLst/>
+          </a:prstGeom>
+        </p:spPr>
+        <p:style>
+          <a:lnRef idx="2">
+            <a:schemeClr val="accent1">
+              <a:shade val="50000"/>
+            </a:schemeClr>
+          </a:lnRef>
+          <a:fillRef idx="1">
+            <a:schemeClr val="accent1"/>
+          </a:fillRef>
+          <a:effectRef idx="0">
+            <a:schemeClr val="accent1"/>
+          </a:effectRef>
+          <a:fontRef idx="minor">
+            <a:schemeClr val="lt1"/>
+          </a:fontRef>
+        </p:style>
+        <p:txBody>
+          <a:bodyPr rtlCol="0" anchor="ctr"/>
+          <a:lstStyle/>
+          <a:p>
+            <a:pPr algn="ctr"/>
+            <a:r>
+              <a:rPr lang="en-US" altLang="zh-CN" dirty="0" smtClean="0"/>
+              <a:t>Dispatch</a:t>
+            </a:r>
+            <a:endParaRPr lang="zh-CN" altLang="en-US" dirty="0"/>
+          </a:p>
+        </p:txBody>
+      </p:sp>
+      <p:sp>
+        <p:nvSpPr>
+          <p:cNvPr id="8" name="左大括号 7"/>
+          <p:cNvSpPr/>
+          <p:nvPr/>
+        </p:nvSpPr>
+        <p:spPr>
+          <a:xfrm>
+            <a:off x="576064" y="1221514"/>
+            <a:ext cx="432048" cy="1612258"/>
+          </a:xfrm>
+          <a:prstGeom prst="leftBrace">
+            <a:avLst/>
+          </a:prstGeom>
+        </p:spPr>
+        <p:style>
+          <a:lnRef idx="1">
+            <a:schemeClr val="accent1"/>
+          </a:lnRef>
+          <a:fillRef idx="0">
+            <a:schemeClr val="accent1"/>
+          </a:fillRef>
+          <a:effectRef idx="0">
+            <a:schemeClr val="accent1"/>
+          </a:effectRef>
+          <a:fontRef idx="minor">
+            <a:schemeClr val="tx1"/>
+          </a:fontRef>
+        </p:style>
+        <p:txBody>
+          <a:bodyPr rtlCol="0" anchor="ctr"/>
+          <a:lstStyle/>
+          <a:p>
+            <a:pPr algn="ctr"/>
+            <a:endParaRPr lang="zh-CN" altLang="en-US"/>
+          </a:p>
+        </p:txBody>
+      </p:sp>
+      <p:sp>
+        <p:nvSpPr>
+          <p:cNvPr id="9" name="TextBox 8"/>
+          <p:cNvSpPr txBox="1"/>
+          <p:nvPr/>
+        </p:nvSpPr>
+        <p:spPr>
+          <a:xfrm>
+            <a:off x="1153839" y="1071150"/>
+            <a:ext cx="1361270" cy="338554"/>
+          </a:xfrm>
+          <a:prstGeom prst="rect">
+            <a:avLst/>
+          </a:prstGeom>
+          <a:noFill/>
+        </p:spPr>
+        <p:txBody>
+          <a:bodyPr wrap="none" rtlCol="0">
+            <a:spAutoFit/>
+          </a:bodyPr>
+          <a:lstStyle/>
+          <a:p>
+            <a:r>
+              <a:rPr lang="en-US" altLang="zh-CN" sz="1600" dirty="0" smtClean="0"/>
+              <a:t>1 </a:t>
+            </a:r>
+            <a:r>
+              <a:rPr lang="zh-CN" altLang="en-US" sz="1600" dirty="0" smtClean="0"/>
+              <a:t>选择资源池</a:t>
+            </a:r>
+            <a:endParaRPr lang="zh-CN" altLang="en-US" sz="1600" dirty="0"/>
+          </a:p>
+        </p:txBody>
+      </p:sp>
+      <p:sp>
+        <p:nvSpPr>
+          <p:cNvPr id="10" name="TextBox 9"/>
+          <p:cNvSpPr txBox="1"/>
+          <p:nvPr/>
+        </p:nvSpPr>
+        <p:spPr>
+          <a:xfrm>
+            <a:off x="1153839" y="1501286"/>
+            <a:ext cx="2023311" cy="338554"/>
+          </a:xfrm>
+          <a:prstGeom prst="rect">
+            <a:avLst/>
+          </a:prstGeom>
+          <a:noFill/>
+        </p:spPr>
+        <p:txBody>
+          <a:bodyPr wrap="none" rtlCol="0">
+            <a:spAutoFit/>
+          </a:bodyPr>
+          <a:lstStyle/>
+          <a:p>
+            <a:r>
+              <a:rPr lang="en-US" altLang="zh-CN" sz="1600" dirty="0" smtClean="0"/>
+              <a:t>2 </a:t>
+            </a:r>
+            <a:r>
+              <a:rPr lang="zh-CN" altLang="en-US" sz="1600" dirty="0" smtClean="0"/>
+              <a:t>填写应用容器名称 </a:t>
+            </a:r>
+            <a:endParaRPr lang="zh-CN" altLang="en-US" sz="1600" dirty="0"/>
+          </a:p>
+        </p:txBody>
+      </p:sp>
+      <p:sp>
+        <p:nvSpPr>
+          <p:cNvPr id="11" name="右大括号 10"/>
+          <p:cNvSpPr/>
+          <p:nvPr/>
+        </p:nvSpPr>
+        <p:spPr>
+          <a:xfrm>
+            <a:off x="3348372" y="1113412"/>
+            <a:ext cx="648072" cy="726428"/>
+          </a:xfrm>
+          <a:prstGeom prst="rightBrace">
+            <a:avLst/>
+          </a:prstGeom>
+        </p:spPr>
+        <p:style>
+          <a:lnRef idx="1">
+            <a:schemeClr val="accent1"/>
+          </a:lnRef>
+          <a:fillRef idx="0">
+            <a:schemeClr val="accent1"/>
+          </a:fillRef>
+          <a:effectRef idx="0">
+            <a:schemeClr val="accent1"/>
+          </a:effectRef>
+          <a:fontRef idx="minor">
+            <a:schemeClr val="tx1"/>
+          </a:fontRef>
+        </p:style>
+        <p:txBody>
+          <a:bodyPr rtlCol="0" anchor="ctr"/>
+          <a:lstStyle/>
+          <a:p>
+            <a:pPr algn="ctr"/>
+            <a:endParaRPr lang="zh-CN" altLang="en-US"/>
+          </a:p>
+        </p:txBody>
+      </p:sp>
+      <p:cxnSp>
+        <p:nvCxnSpPr>
+          <p:cNvPr id="13" name="直接箭头连接符 12"/>
+          <p:cNvCxnSpPr>
+            <a:stCxn id="11" idx="1"/>
+          </p:cNvCxnSpPr>
+          <p:nvPr/>
+        </p:nvCxnSpPr>
+        <p:spPr>
+          <a:xfrm>
+            <a:off x="3996444" y="1476626"/>
+            <a:ext cx="2196244" cy="0"/>
+          </a:xfrm>
+          <a:prstGeom prst="straightConnector1">
+            <a:avLst/>
+          </a:prstGeom>
+          <a:ln>
+            <a:tailEnd type="arrow"/>
+          </a:ln>
+        </p:spPr>
+        <p:style>
+          <a:lnRef idx="1">
+            <a:schemeClr val="accent1"/>
+          </a:lnRef>
+          <a:fillRef idx="0">
+            <a:schemeClr val="accent1"/>
+          </a:fillRef>
+          <a:effectRef idx="0">
+            <a:schemeClr val="accent1"/>
+          </a:effectRef>
+          <a:fontRef idx="minor">
+            <a:schemeClr val="tx1"/>
+          </a:fontRef>
+        </p:style>
+      </p:cxnSp>
+      <p:sp>
+        <p:nvSpPr>
+          <p:cNvPr id="14" name="TextBox 13"/>
+          <p:cNvSpPr txBox="1"/>
+          <p:nvPr/>
+        </p:nvSpPr>
+        <p:spPr>
+          <a:xfrm>
+            <a:off x="3816423" y="851802"/>
+            <a:ext cx="3775393" cy="523220"/>
+          </a:xfrm>
+          <a:prstGeom prst="rect">
+            <a:avLst/>
+          </a:prstGeom>
+          <a:noFill/>
+        </p:spPr>
+        <p:txBody>
+          <a:bodyPr wrap="none" rtlCol="0">
+            <a:spAutoFit/>
+          </a:bodyPr>
+          <a:lstStyle/>
+          <a:p>
+            <a:r>
+              <a:rPr lang="zh-CN" altLang="en-US" sz="1400" dirty="0" smtClean="0"/>
+              <a:t>使用</a:t>
+            </a:r>
+            <a:r>
+              <a:rPr lang="en-US" altLang="zh-CN" sz="1400" dirty="0" smtClean="0"/>
+              <a:t>1</a:t>
+            </a:r>
+            <a:r>
+              <a:rPr lang="zh-CN" altLang="en-US" sz="1400" dirty="0" smtClean="0"/>
+              <a:t>，</a:t>
+            </a:r>
+            <a:r>
+              <a:rPr lang="en-US" altLang="zh-CN" sz="1400" dirty="0" smtClean="0"/>
+              <a:t>2</a:t>
+            </a:r>
+            <a:r>
+              <a:rPr lang="zh-CN" altLang="en-US" sz="1400" dirty="0" smtClean="0"/>
+              <a:t>条件去数据库判断名称</a:t>
+            </a:r>
+            <a:endParaRPr lang="en-US" altLang="zh-CN" sz="1400" dirty="0" smtClean="0"/>
+          </a:p>
+          <a:p>
+            <a:r>
+              <a:rPr lang="zh-CN" altLang="en-US" sz="1400" dirty="0" smtClean="0"/>
+              <a:t>是否被使用，以保证资源池内容器名全局唯一</a:t>
+            </a:r>
+            <a:endParaRPr lang="zh-CN" altLang="en-US" sz="1400" dirty="0"/>
+          </a:p>
+        </p:txBody>
+      </p:sp>
+      <p:sp>
+        <p:nvSpPr>
+          <p:cNvPr id="15" name="TextBox 14"/>
+          <p:cNvSpPr txBox="1"/>
+          <p:nvPr/>
+        </p:nvSpPr>
+        <p:spPr>
+          <a:xfrm>
+            <a:off x="1153839" y="1877272"/>
+            <a:ext cx="1566454" cy="338554"/>
+          </a:xfrm>
+          <a:prstGeom prst="rect">
+            <a:avLst/>
+          </a:prstGeom>
+          <a:noFill/>
+        </p:spPr>
+        <p:txBody>
+          <a:bodyPr wrap="none" rtlCol="0">
+            <a:spAutoFit/>
+          </a:bodyPr>
+          <a:lstStyle/>
+          <a:p>
+            <a:r>
+              <a:rPr lang="en-US" altLang="zh-CN" sz="1600" dirty="0" smtClean="0"/>
+              <a:t>3 </a:t>
+            </a:r>
+            <a:r>
+              <a:rPr lang="zh-CN" altLang="en-US" sz="1600" dirty="0" smtClean="0"/>
+              <a:t>填写创建数量</a:t>
+            </a:r>
+            <a:endParaRPr lang="zh-CN" altLang="en-US" sz="1600" dirty="0"/>
+          </a:p>
+        </p:txBody>
+      </p:sp>
+      <p:sp>
+        <p:nvSpPr>
+          <p:cNvPr id="16" name="TextBox 15"/>
+          <p:cNvSpPr txBox="1"/>
+          <p:nvPr/>
+        </p:nvSpPr>
+        <p:spPr>
+          <a:xfrm>
+            <a:off x="1140741" y="2215826"/>
+            <a:ext cx="3002745" cy="338554"/>
+          </a:xfrm>
+          <a:prstGeom prst="rect">
+            <a:avLst/>
+          </a:prstGeom>
+          <a:noFill/>
+        </p:spPr>
+        <p:txBody>
+          <a:bodyPr wrap="none" rtlCol="0">
+            <a:spAutoFit/>
+          </a:bodyPr>
+          <a:lstStyle/>
+          <a:p>
+            <a:r>
+              <a:rPr lang="en-US" altLang="zh-CN" sz="1600" dirty="0" smtClean="0"/>
+              <a:t>4 </a:t>
+            </a:r>
+            <a:r>
+              <a:rPr lang="zh-CN" altLang="en-US" sz="1600" dirty="0" smtClean="0"/>
+              <a:t>容器分布方式（随机，指定）</a:t>
+            </a:r>
+            <a:endParaRPr lang="zh-CN" altLang="en-US" sz="1600" dirty="0"/>
+          </a:p>
+        </p:txBody>
+      </p:sp>
+      <p:sp>
+        <p:nvSpPr>
+          <p:cNvPr id="17" name="TextBox 16"/>
+          <p:cNvSpPr txBox="1"/>
+          <p:nvPr/>
+        </p:nvSpPr>
+        <p:spPr>
+          <a:xfrm>
+            <a:off x="1131101" y="2617748"/>
+            <a:ext cx="4485523" cy="338554"/>
+          </a:xfrm>
+          <a:prstGeom prst="rect">
+            <a:avLst/>
+          </a:prstGeom>
+          <a:noFill/>
+        </p:spPr>
+        <p:txBody>
+          <a:bodyPr wrap="none" rtlCol="0">
+            <a:spAutoFit/>
+          </a:bodyPr>
+          <a:lstStyle/>
+          <a:p>
+            <a:r>
+              <a:rPr lang="en-US" altLang="zh-CN" sz="1600" dirty="0" smtClean="0"/>
+              <a:t>5 </a:t>
+            </a:r>
+            <a:r>
+              <a:rPr lang="zh-CN" altLang="en-US" sz="1600" dirty="0" smtClean="0"/>
+              <a:t>（分布方式：指定）选择主机并分配容器数量</a:t>
+            </a:r>
+            <a:r>
+              <a:rPr lang="en-US" altLang="zh-CN" sz="1600" dirty="0" smtClean="0"/>
+              <a:t> </a:t>
+            </a:r>
+            <a:endParaRPr lang="zh-CN" altLang="en-US" sz="1600" dirty="0"/>
+          </a:p>
+        </p:txBody>
+      </p:sp>
+      <p:cxnSp>
+        <p:nvCxnSpPr>
+          <p:cNvPr id="20" name="直接箭头连接符 19"/>
+          <p:cNvCxnSpPr/>
+          <p:nvPr/>
+        </p:nvCxnSpPr>
+        <p:spPr>
+          <a:xfrm>
+            <a:off x="4175956" y="3265820"/>
+            <a:ext cx="0" cy="576064"/>
+          </a:xfrm>
+          <a:prstGeom prst="straightConnector1">
+            <a:avLst/>
+          </a:prstGeom>
+          <a:ln>
+            <a:tailEnd type="arrow"/>
+          </a:ln>
+        </p:spPr>
+        <p:style>
+          <a:lnRef idx="1">
+            <a:schemeClr val="accent1"/>
+          </a:lnRef>
+          <a:fillRef idx="0">
+            <a:schemeClr val="accent1"/>
+          </a:fillRef>
+          <a:effectRef idx="0">
+            <a:schemeClr val="accent1"/>
+          </a:effectRef>
+          <a:fontRef idx="minor">
+            <a:schemeClr val="tx1"/>
+          </a:fontRef>
+        </p:style>
+      </p:cxnSp>
+      <p:sp>
+        <p:nvSpPr>
+          <p:cNvPr id="21" name="矩形 20"/>
+          <p:cNvSpPr/>
+          <p:nvPr/>
+        </p:nvSpPr>
+        <p:spPr>
+          <a:xfrm>
+            <a:off x="216025" y="5157192"/>
+            <a:ext cx="8676456" cy="1446110"/>
+          </a:xfrm>
+          <a:prstGeom prst="rect">
+            <a:avLst/>
+          </a:prstGeom>
+          <a:solidFill>
+            <a:schemeClr val="bg1"/>
+          </a:solidFill>
+          <a:ln>
+            <a:solidFill>
+              <a:schemeClr val="accent6">
+                <a:lumMod val="75000"/>
+              </a:schemeClr>
+            </a:solidFill>
+          </a:ln>
+        </p:spPr>
+        <p:style>
+          <a:lnRef idx="2">
+            <a:schemeClr val="accent1">
+              <a:shade val="50000"/>
+            </a:schemeClr>
+          </a:lnRef>
+          <a:fillRef idx="1">
+            <a:schemeClr val="accent1"/>
+          </a:fillRef>
+          <a:effectRef idx="0">
+            <a:schemeClr val="accent1"/>
+          </a:effectRef>
+          <a:fontRef idx="minor">
+            <a:schemeClr val="lt1"/>
+          </a:fontRef>
+        </p:style>
+        <p:txBody>
+          <a:bodyPr rtlCol="0" anchor="ctr"/>
+          <a:lstStyle/>
+          <a:p>
+            <a:pPr algn="ctr"/>
+            <a:endParaRPr lang="zh-CN" altLang="en-US"/>
+          </a:p>
+        </p:txBody>
+      </p:sp>
+      <p:sp>
+        <p:nvSpPr>
+          <p:cNvPr id="23" name="流程图: 过程 22"/>
+          <p:cNvSpPr/>
+          <p:nvPr/>
+        </p:nvSpPr>
+        <p:spPr>
+          <a:xfrm>
+            <a:off x="455852" y="5733256"/>
+            <a:ext cx="971600" cy="720080"/>
+          </a:xfrm>
+          <a:prstGeom prst="flowChartProcess">
+            <a:avLst/>
+          </a:prstGeom>
+          <a:solidFill>
+            <a:schemeClr val="accent3"/>
+          </a:solidFill>
+          <a:ln>
+            <a:noFill/>
+          </a:ln>
+        </p:spPr>
+        <p:style>
+          <a:lnRef idx="2">
+            <a:schemeClr val="accent1">
+              <a:shade val="50000"/>
+            </a:schemeClr>
+          </a:lnRef>
+          <a:fillRef idx="1">
+            <a:schemeClr val="accent1"/>
+          </a:fillRef>
+          <a:effectRef idx="0">
+            <a:schemeClr val="accent1"/>
+          </a:effectRef>
+          <a:fontRef idx="minor">
+            <a:schemeClr val="lt1"/>
+          </a:fontRef>
+        </p:style>
+        <p:txBody>
+          <a:bodyPr rtlCol="0" anchor="ctr"/>
+          <a:lstStyle/>
+          <a:p>
+            <a:pPr algn="ctr"/>
+            <a:r>
+              <a:rPr lang="en-US" altLang="zh-CN" dirty="0" smtClean="0"/>
+              <a:t>Node 1</a:t>
+            </a:r>
+            <a:endParaRPr lang="zh-CN" altLang="en-US" dirty="0"/>
+          </a:p>
+        </p:txBody>
+      </p:sp>
+      <p:cxnSp>
+        <p:nvCxnSpPr>
+          <p:cNvPr id="27" name="直接箭头连接符 26"/>
+          <p:cNvCxnSpPr>
+            <a:stCxn id="7" idx="2"/>
+          </p:cNvCxnSpPr>
+          <p:nvPr/>
+        </p:nvCxnSpPr>
+        <p:spPr>
+          <a:xfrm>
+            <a:off x="4175956" y="4705980"/>
+            <a:ext cx="1" cy="451212"/>
+          </a:xfrm>
+          <a:prstGeom prst="straightConnector1">
+            <a:avLst/>
+          </a:prstGeom>
+          <a:ln>
+            <a:tailEnd type="arrow"/>
+          </a:ln>
+        </p:spPr>
+        <p:style>
+          <a:lnRef idx="1">
+            <a:schemeClr val="accent1"/>
+          </a:lnRef>
+          <a:fillRef idx="0">
+            <a:schemeClr val="accent1"/>
+          </a:fillRef>
+          <a:effectRef idx="0">
+            <a:schemeClr val="accent1"/>
+          </a:effectRef>
+          <a:fontRef idx="minor">
+            <a:schemeClr val="tx1"/>
+          </a:fontRef>
+        </p:style>
+      </p:cxnSp>
+      <p:sp>
+        <p:nvSpPr>
+          <p:cNvPr id="28" name="TextBox 27"/>
+          <p:cNvSpPr txBox="1"/>
+          <p:nvPr/>
+        </p:nvSpPr>
+        <p:spPr>
+          <a:xfrm>
+            <a:off x="264814" y="620688"/>
+            <a:ext cx="1569660" cy="369332"/>
+          </a:xfrm>
+          <a:prstGeom prst="rect">
+            <a:avLst/>
+          </a:prstGeom>
+          <a:noFill/>
+        </p:spPr>
+        <p:txBody>
+          <a:bodyPr wrap="none" rtlCol="0">
+            <a:spAutoFit/>
+          </a:bodyPr>
+          <a:lstStyle/>
+          <a:p>
+            <a:r>
+              <a:rPr lang="zh-CN" altLang="en-US" b="1" dirty="0" smtClean="0">
+                <a:solidFill>
+                  <a:srgbClr val="FF0000"/>
+                </a:solidFill>
+              </a:rPr>
+              <a:t>创建容器条件</a:t>
+            </a:r>
+            <a:endParaRPr lang="zh-CN" altLang="en-US" b="1" dirty="0">
+              <a:solidFill>
+                <a:srgbClr val="FF0000"/>
+              </a:solidFill>
+            </a:endParaRPr>
+          </a:p>
+        </p:txBody>
+      </p:sp>
+      <p:sp>
+        <p:nvSpPr>
+          <p:cNvPr id="29" name="TextBox 28"/>
+          <p:cNvSpPr txBox="1"/>
+          <p:nvPr/>
+        </p:nvSpPr>
+        <p:spPr>
+          <a:xfrm>
+            <a:off x="223282" y="5204160"/>
+            <a:ext cx="1436740" cy="369332"/>
+          </a:xfrm>
+          <a:prstGeom prst="rect">
+            <a:avLst/>
+          </a:prstGeom>
+          <a:noFill/>
+        </p:spPr>
+        <p:txBody>
+          <a:bodyPr wrap="none" rtlCol="0">
+            <a:spAutoFit/>
+          </a:bodyPr>
+          <a:lstStyle/>
+          <a:p>
+            <a:r>
+              <a:rPr lang="en-US" altLang="zh-CN" b="1" dirty="0" smtClean="0">
+                <a:solidFill>
+                  <a:srgbClr val="FF0000"/>
+                </a:solidFill>
+              </a:rPr>
+              <a:t>Docker  pool </a:t>
+            </a:r>
+            <a:endParaRPr lang="zh-CN" altLang="en-US" b="1" dirty="0">
+              <a:solidFill>
+                <a:srgbClr val="FF0000"/>
+              </a:solidFill>
+            </a:endParaRPr>
+          </a:p>
+        </p:txBody>
+      </p:sp>
+      <p:sp>
+        <p:nvSpPr>
+          <p:cNvPr id="30" name="流程图: 过程 29"/>
+          <p:cNvSpPr/>
+          <p:nvPr/>
+        </p:nvSpPr>
+        <p:spPr>
+          <a:xfrm>
+            <a:off x="1937066" y="5733256"/>
+            <a:ext cx="971600" cy="720080"/>
+          </a:xfrm>
+          <a:prstGeom prst="flowChartProcess">
+            <a:avLst/>
+          </a:prstGeom>
+          <a:solidFill>
+            <a:schemeClr val="accent3"/>
+          </a:solidFill>
+          <a:ln>
+            <a:noFill/>
+          </a:ln>
+        </p:spPr>
+        <p:style>
+          <a:lnRef idx="2">
+            <a:schemeClr val="accent1">
+              <a:shade val="50000"/>
+            </a:schemeClr>
+          </a:lnRef>
+          <a:fillRef idx="1">
+            <a:schemeClr val="accent1"/>
+          </a:fillRef>
+          <a:effectRef idx="0">
+            <a:schemeClr val="accent1"/>
+          </a:effectRef>
+          <a:fontRef idx="minor">
+            <a:schemeClr val="lt1"/>
+          </a:fontRef>
+        </p:style>
+        <p:txBody>
+          <a:bodyPr rtlCol="0" anchor="ctr"/>
+          <a:lstStyle/>
+          <a:p>
+            <a:pPr algn="ctr"/>
+            <a:r>
+              <a:rPr lang="en-US" altLang="zh-CN" dirty="0" smtClean="0"/>
+              <a:t>Node 2</a:t>
+            </a:r>
+            <a:endParaRPr lang="zh-CN" altLang="en-US" dirty="0"/>
+          </a:p>
+        </p:txBody>
+      </p:sp>
+      <p:sp>
+        <p:nvSpPr>
+          <p:cNvPr id="31" name="流程图: 过程 30"/>
+          <p:cNvSpPr/>
+          <p:nvPr/>
+        </p:nvSpPr>
+        <p:spPr>
+          <a:xfrm>
+            <a:off x="3330623" y="5733256"/>
+            <a:ext cx="971600" cy="720080"/>
+          </a:xfrm>
+          <a:prstGeom prst="flowChartProcess">
+            <a:avLst/>
+          </a:prstGeom>
+          <a:solidFill>
+            <a:schemeClr val="accent3"/>
+          </a:solidFill>
+          <a:ln>
+            <a:noFill/>
+          </a:ln>
+        </p:spPr>
+        <p:style>
+          <a:lnRef idx="2">
+            <a:schemeClr val="accent1">
+              <a:shade val="50000"/>
+            </a:schemeClr>
+          </a:lnRef>
+          <a:fillRef idx="1">
+            <a:schemeClr val="accent1"/>
+          </a:fillRef>
+          <a:effectRef idx="0">
+            <a:schemeClr val="accent1"/>
+          </a:effectRef>
+          <a:fontRef idx="minor">
+            <a:schemeClr val="lt1"/>
+          </a:fontRef>
+        </p:style>
+        <p:txBody>
+          <a:bodyPr rtlCol="0" anchor="ctr"/>
+          <a:lstStyle/>
+          <a:p>
+            <a:pPr algn="ctr"/>
+            <a:r>
+              <a:rPr lang="en-US" altLang="zh-CN" dirty="0" smtClean="0"/>
+              <a:t>Node 3</a:t>
+            </a:r>
+            <a:endParaRPr lang="zh-CN" altLang="en-US" dirty="0"/>
+          </a:p>
+        </p:txBody>
+      </p:sp>
+      <p:sp>
+        <p:nvSpPr>
+          <p:cNvPr id="32" name="流程图: 过程 31"/>
+          <p:cNvSpPr/>
+          <p:nvPr/>
+        </p:nvSpPr>
+        <p:spPr>
+          <a:xfrm>
+            <a:off x="4758167" y="5733256"/>
+            <a:ext cx="971600" cy="720080"/>
+          </a:xfrm>
+          <a:prstGeom prst="flowChartProcess">
+            <a:avLst/>
+          </a:prstGeom>
+          <a:solidFill>
+            <a:schemeClr val="accent3"/>
+          </a:solidFill>
+          <a:ln>
+            <a:noFill/>
+          </a:ln>
+        </p:spPr>
+        <p:style>
+          <a:lnRef idx="2">
+            <a:schemeClr val="accent1">
+              <a:shade val="50000"/>
+            </a:schemeClr>
+          </a:lnRef>
+          <a:fillRef idx="1">
+            <a:schemeClr val="accent1"/>
+          </a:fillRef>
+          <a:effectRef idx="0">
+            <a:schemeClr val="accent1"/>
+          </a:effectRef>
+          <a:fontRef idx="minor">
+            <a:schemeClr val="lt1"/>
+          </a:fontRef>
+        </p:style>
+        <p:txBody>
+          <a:bodyPr rtlCol="0" anchor="ctr"/>
+          <a:lstStyle/>
+          <a:p>
+            <a:pPr algn="ctr"/>
+            <a:r>
+              <a:rPr lang="en-US" altLang="zh-CN" dirty="0" smtClean="0"/>
+              <a:t>Node 4</a:t>
+            </a:r>
+            <a:endParaRPr lang="zh-CN" altLang="en-US" dirty="0"/>
+          </a:p>
+        </p:txBody>
+      </p:sp>
+      <p:sp>
+        <p:nvSpPr>
+          <p:cNvPr id="33" name="流程图: 过程 32"/>
+          <p:cNvSpPr/>
+          <p:nvPr/>
+        </p:nvSpPr>
+        <p:spPr>
+          <a:xfrm>
+            <a:off x="6144233" y="5733256"/>
+            <a:ext cx="971600" cy="720080"/>
+          </a:xfrm>
+          <a:prstGeom prst="flowChartProcess">
+            <a:avLst/>
+          </a:prstGeom>
+          <a:solidFill>
+            <a:schemeClr val="accent3"/>
+          </a:solidFill>
+          <a:ln>
+            <a:noFill/>
+          </a:ln>
+        </p:spPr>
+        <p:style>
+          <a:lnRef idx="2">
+            <a:schemeClr val="accent1">
+              <a:shade val="50000"/>
+            </a:schemeClr>
+          </a:lnRef>
+          <a:fillRef idx="1">
+            <a:schemeClr val="accent1"/>
+          </a:fillRef>
+          <a:effectRef idx="0">
+            <a:schemeClr val="accent1"/>
+          </a:effectRef>
+          <a:fontRef idx="minor">
+            <a:schemeClr val="lt1"/>
+          </a:fontRef>
+        </p:style>
+        <p:txBody>
+          <a:bodyPr rtlCol="0" anchor="ctr"/>
+          <a:lstStyle/>
+          <a:p>
+            <a:pPr algn="ctr"/>
+            <a:r>
+              <a:rPr lang="en-US" altLang="zh-CN" dirty="0" smtClean="0"/>
+              <a:t>Node 5</a:t>
+            </a:r>
+            <a:endParaRPr lang="zh-CN" altLang="en-US" dirty="0"/>
+          </a:p>
+        </p:txBody>
+      </p:sp>
+      <p:sp>
+        <p:nvSpPr>
+          <p:cNvPr id="34" name="流程图: 过程 33"/>
+          <p:cNvSpPr/>
+          <p:nvPr/>
+        </p:nvSpPr>
+        <p:spPr>
+          <a:xfrm>
+            <a:off x="7598307" y="5733256"/>
+            <a:ext cx="971600" cy="720080"/>
+          </a:xfrm>
+          <a:prstGeom prst="flowChartProcess">
+            <a:avLst/>
+          </a:prstGeom>
+          <a:solidFill>
+            <a:schemeClr val="accent3"/>
+          </a:solidFill>
+          <a:ln>
+            <a:noFill/>
+          </a:ln>
+        </p:spPr>
+        <p:style>
+          <a:lnRef idx="2">
+            <a:schemeClr val="accent1">
+              <a:shade val="50000"/>
+            </a:schemeClr>
+          </a:lnRef>
+          <a:fillRef idx="1">
+            <a:schemeClr val="accent1"/>
+          </a:fillRef>
+          <a:effectRef idx="0">
+            <a:schemeClr val="accent1"/>
+          </a:effectRef>
+          <a:fontRef idx="minor">
+            <a:schemeClr val="lt1"/>
+          </a:fontRef>
+        </p:style>
+        <p:txBody>
+          <a:bodyPr rtlCol="0" anchor="ctr"/>
+          <a:lstStyle/>
+          <a:p>
+            <a:pPr algn="ctr"/>
+            <a:r>
+              <a:rPr lang="en-US" altLang="zh-CN" dirty="0" smtClean="0"/>
+              <a:t>Node 6</a:t>
+            </a:r>
+            <a:endParaRPr lang="zh-CN" altLang="en-US" dirty="0"/>
+          </a:p>
+        </p:txBody>
+      </p:sp>
+      <p:sp>
+        <p:nvSpPr>
+          <p:cNvPr id="36" name="矩形 35"/>
+          <p:cNvSpPr/>
+          <p:nvPr/>
+        </p:nvSpPr>
+        <p:spPr>
+          <a:xfrm>
+            <a:off x="125493" y="3534107"/>
+            <a:ext cx="1301959" cy="307777"/>
+          </a:xfrm>
+          <a:prstGeom prst="rect">
+            <a:avLst/>
+          </a:prstGeom>
+        </p:spPr>
+        <p:txBody>
+          <a:bodyPr wrap="none">
+            <a:spAutoFit/>
+          </a:bodyPr>
+          <a:lstStyle/>
+          <a:p>
+            <a:r>
+              <a:rPr lang="zh-CN" altLang="en-US" sz="1400" dirty="0"/>
+              <a:t>应用容器名称 </a:t>
+            </a:r>
+          </a:p>
+        </p:txBody>
+      </p:sp>
+      <p:sp>
+        <p:nvSpPr>
+          <p:cNvPr id="37" name="矩形 36"/>
+          <p:cNvSpPr/>
+          <p:nvPr/>
+        </p:nvSpPr>
+        <p:spPr>
+          <a:xfrm>
+            <a:off x="1312251" y="3598272"/>
+            <a:ext cx="851183" cy="179446"/>
+          </a:xfrm>
+          <a:prstGeom prst="rect">
+            <a:avLst/>
+          </a:prstGeom>
+          <a:solidFill>
+            <a:schemeClr val="bg1"/>
+          </a:solidFill>
+          <a:ln w="12700">
+            <a:solidFill>
+              <a:schemeClr val="tx1"/>
+            </a:solidFill>
+          </a:ln>
+        </p:spPr>
+        <p:style>
+          <a:lnRef idx="2">
+            <a:schemeClr val="accent1">
+              <a:shade val="50000"/>
+            </a:schemeClr>
+          </a:lnRef>
+          <a:fillRef idx="1">
+            <a:schemeClr val="accent1"/>
+          </a:fillRef>
+          <a:effectRef idx="0">
+            <a:schemeClr val="accent1"/>
+          </a:effectRef>
+          <a:fontRef idx="minor">
+            <a:schemeClr val="lt1"/>
+          </a:fontRef>
+        </p:style>
+        <p:txBody>
+          <a:bodyPr rtlCol="0" anchor="ctr"/>
+          <a:lstStyle/>
+          <a:p>
+            <a:pPr algn="ctr"/>
+            <a:r>
+              <a:rPr lang="en-US" altLang="zh-CN" sz="1400" dirty="0" smtClean="0">
+                <a:solidFill>
+                  <a:schemeClr val="tx1"/>
+                </a:solidFill>
+              </a:rPr>
+              <a:t>firecloud</a:t>
+            </a:r>
+            <a:endParaRPr lang="zh-CN" altLang="en-US" sz="1400" dirty="0">
+              <a:solidFill>
+                <a:schemeClr val="tx1"/>
+              </a:solidFill>
+            </a:endParaRPr>
+          </a:p>
+        </p:txBody>
+      </p:sp>
+      <p:sp>
+        <p:nvSpPr>
+          <p:cNvPr id="38" name="矩形 37"/>
+          <p:cNvSpPr/>
+          <p:nvPr/>
+        </p:nvSpPr>
+        <p:spPr>
+          <a:xfrm>
+            <a:off x="2185391" y="3548577"/>
+            <a:ext cx="723275" cy="307777"/>
+          </a:xfrm>
+          <a:prstGeom prst="rect">
+            <a:avLst/>
+          </a:prstGeom>
+        </p:spPr>
+        <p:txBody>
+          <a:bodyPr wrap="none">
+            <a:spAutoFit/>
+          </a:bodyPr>
+          <a:lstStyle/>
+          <a:p>
+            <a:r>
+              <a:rPr lang="zh-CN" altLang="en-US" sz="1400" dirty="0" smtClean="0"/>
+              <a:t>递增位</a:t>
+            </a:r>
+            <a:endParaRPr lang="zh-CN" altLang="en-US" sz="1400" dirty="0"/>
+          </a:p>
+        </p:txBody>
+      </p:sp>
+      <p:sp>
+        <p:nvSpPr>
+          <p:cNvPr id="39" name="矩形 38"/>
+          <p:cNvSpPr/>
+          <p:nvPr/>
+        </p:nvSpPr>
+        <p:spPr>
+          <a:xfrm>
+            <a:off x="2865252" y="3609594"/>
+            <a:ext cx="851183" cy="179446"/>
+          </a:xfrm>
+          <a:prstGeom prst="rect">
+            <a:avLst/>
+          </a:prstGeom>
+          <a:solidFill>
+            <a:schemeClr val="bg1"/>
+          </a:solidFill>
+          <a:ln w="12700">
+            <a:solidFill>
+              <a:schemeClr val="tx1"/>
+            </a:solidFill>
+          </a:ln>
+        </p:spPr>
+        <p:style>
+          <a:lnRef idx="2">
+            <a:schemeClr val="accent1">
+              <a:shade val="50000"/>
+            </a:schemeClr>
+          </a:lnRef>
+          <a:fillRef idx="1">
+            <a:schemeClr val="accent1"/>
+          </a:fillRef>
+          <a:effectRef idx="0">
+            <a:schemeClr val="accent1"/>
+          </a:effectRef>
+          <a:fontRef idx="minor">
+            <a:schemeClr val="lt1"/>
+          </a:fontRef>
+        </p:style>
+        <p:txBody>
+          <a:bodyPr rtlCol="0" anchor="ctr"/>
+          <a:lstStyle/>
+          <a:p>
+            <a:pPr algn="ctr"/>
+            <a:r>
+              <a:rPr lang="en-US" altLang="zh-CN" dirty="0" smtClean="0">
+                <a:solidFill>
+                  <a:schemeClr val="tx1"/>
+                </a:solidFill>
+              </a:rPr>
+              <a:t>2</a:t>
+            </a:r>
+            <a:endParaRPr lang="zh-CN" altLang="en-US" dirty="0">
+              <a:solidFill>
+                <a:schemeClr val="tx1"/>
+              </a:solidFill>
+            </a:endParaRPr>
+          </a:p>
+        </p:txBody>
+      </p:sp>
+      <p:sp>
+        <p:nvSpPr>
+          <p:cNvPr id="42" name="TextBox 41"/>
+          <p:cNvSpPr txBox="1"/>
+          <p:nvPr/>
+        </p:nvSpPr>
+        <p:spPr>
+          <a:xfrm>
+            <a:off x="163824" y="3966155"/>
+            <a:ext cx="2028119" cy="954107"/>
+          </a:xfrm>
+          <a:prstGeom prst="rect">
+            <a:avLst/>
+          </a:prstGeom>
+          <a:noFill/>
+        </p:spPr>
+        <p:txBody>
+          <a:bodyPr wrap="none" rtlCol="0">
+            <a:spAutoFit/>
+          </a:bodyPr>
+          <a:lstStyle/>
+          <a:p>
+            <a:r>
+              <a:rPr lang="zh-CN" altLang="en-US" sz="1400" dirty="0" smtClean="0"/>
+              <a:t>创建出来的容器名如下</a:t>
+            </a:r>
+            <a:r>
+              <a:rPr lang="en-US" altLang="zh-CN" sz="1400" dirty="0" smtClean="0"/>
+              <a:t>:</a:t>
+            </a:r>
+          </a:p>
+          <a:p>
+            <a:r>
+              <a:rPr lang="en-US" altLang="zh-CN" sz="1400" dirty="0" smtClean="0">
+                <a:solidFill>
+                  <a:srgbClr val="FF0000"/>
+                </a:solidFill>
+              </a:rPr>
+              <a:t>firecloud01</a:t>
+            </a:r>
+          </a:p>
+          <a:p>
+            <a:r>
+              <a:rPr lang="en-US" altLang="zh-CN" sz="1400" dirty="0" smtClean="0">
+                <a:solidFill>
+                  <a:srgbClr val="FF0000"/>
+                </a:solidFill>
+              </a:rPr>
+              <a:t>firecloud02</a:t>
+            </a:r>
+          </a:p>
+          <a:p>
+            <a:r>
+              <a:rPr lang="en-US" altLang="zh-CN" sz="1400" dirty="0" smtClean="0">
+                <a:solidFill>
+                  <a:srgbClr val="FF0000"/>
+                </a:solidFill>
+              </a:rPr>
+              <a:t>…..</a:t>
+            </a:r>
+            <a:endParaRPr lang="zh-CN" altLang="en-US" sz="1400" dirty="0">
+              <a:solidFill>
+                <a:srgbClr val="FF0000"/>
+              </a:solidFill>
+            </a:endParaRPr>
+          </a:p>
+        </p:txBody>
+      </p:sp>
+      <p:sp>
+        <p:nvSpPr>
+          <p:cNvPr id="43" name="矩形 42"/>
+          <p:cNvSpPr/>
+          <p:nvPr/>
+        </p:nvSpPr>
+        <p:spPr>
+          <a:xfrm>
+            <a:off x="6035926" y="3867025"/>
+            <a:ext cx="1261603" cy="740743"/>
+          </a:xfrm>
+          <a:prstGeom prst="rect">
+            <a:avLst/>
+          </a:prstGeom>
+        </p:spPr>
+        <p:style>
+          <a:lnRef idx="2">
+            <a:schemeClr val="accent1">
+              <a:shade val="50000"/>
+            </a:schemeClr>
+          </a:lnRef>
+          <a:fillRef idx="1">
+            <a:schemeClr val="accent1"/>
+          </a:fillRef>
+          <a:effectRef idx="0">
+            <a:schemeClr val="accent1"/>
+          </a:effectRef>
+          <a:fontRef idx="minor">
+            <a:schemeClr val="lt1"/>
+          </a:fontRef>
+        </p:style>
+        <p:txBody>
+          <a:bodyPr rtlCol="0" anchor="ctr"/>
+          <a:lstStyle/>
+          <a:p>
+            <a:pPr algn="ctr"/>
+            <a:r>
+              <a:rPr lang="en-US" altLang="zh-CN" dirty="0" smtClean="0"/>
+              <a:t>registrar</a:t>
+            </a:r>
+            <a:endParaRPr lang="zh-CN" altLang="en-US" dirty="0"/>
+          </a:p>
+        </p:txBody>
+      </p:sp>
+      <p:cxnSp>
+        <p:nvCxnSpPr>
+          <p:cNvPr id="45" name="直接箭头连接符 44"/>
+          <p:cNvCxnSpPr>
+            <a:stCxn id="7" idx="3"/>
+          </p:cNvCxnSpPr>
+          <p:nvPr/>
+        </p:nvCxnSpPr>
+        <p:spPr>
+          <a:xfrm>
+            <a:off x="5292080" y="4273932"/>
+            <a:ext cx="701824" cy="0"/>
+          </a:xfrm>
+          <a:prstGeom prst="straightConnector1">
+            <a:avLst/>
+          </a:prstGeom>
+          <a:ln>
+            <a:tailEnd type="arrow"/>
+          </a:ln>
+        </p:spPr>
+        <p:style>
+          <a:lnRef idx="1">
+            <a:schemeClr val="accent1"/>
+          </a:lnRef>
+          <a:fillRef idx="0">
+            <a:schemeClr val="accent1"/>
+          </a:fillRef>
+          <a:effectRef idx="0">
+            <a:schemeClr val="accent1"/>
+          </a:effectRef>
+          <a:fontRef idx="minor">
+            <a:schemeClr val="tx1"/>
+          </a:fontRef>
+        </p:style>
+      </p:cxnSp>
+      <p:sp>
+        <p:nvSpPr>
+          <p:cNvPr id="46" name="TextBox 45"/>
+          <p:cNvSpPr txBox="1"/>
+          <p:nvPr/>
+        </p:nvSpPr>
+        <p:spPr>
+          <a:xfrm>
+            <a:off x="7461911" y="3867025"/>
+            <a:ext cx="1107996" cy="646331"/>
+          </a:xfrm>
+          <a:prstGeom prst="rect">
+            <a:avLst/>
+          </a:prstGeom>
+          <a:noFill/>
+        </p:spPr>
+        <p:txBody>
+          <a:bodyPr wrap="none" rtlCol="0">
+            <a:spAutoFit/>
+          </a:bodyPr>
+          <a:lstStyle/>
+          <a:p>
+            <a:r>
+              <a:rPr lang="zh-CN" altLang="en-US" dirty="0" smtClean="0"/>
+              <a:t>注册，</a:t>
+            </a:r>
+            <a:endParaRPr lang="en-US" altLang="zh-CN" dirty="0" smtClean="0"/>
+          </a:p>
+          <a:p>
+            <a:r>
+              <a:rPr lang="zh-CN" altLang="en-US" dirty="0" smtClean="0"/>
+              <a:t>端口管理</a:t>
+            </a:r>
+            <a:endParaRPr lang="zh-CN" altLang="en-US" dirty="0"/>
+          </a:p>
+        </p:txBody>
+      </p:sp>
+    </p:spTree>
+    <p:extLst>
+      <p:ext uri="{BB962C8B-B14F-4D97-AF65-F5344CB8AC3E}">
+        <p14:creationId xmlns:p14="http://schemas.microsoft.com/office/powerpoint/2010/main" val="3242717349"/>
+      </p:ext>
+    </p:extLst>
+  </p:cSld>
+  <p:clrMapOvr>
+    <a:masterClrMapping/>
+  </p:clrMapOvr>
+</p:sld>
+</file>
+
+<file path=ppt/slides/slide8.xml><?xml version="1.0" encoding="utf-8"?>
+<p:sld xmlns:a="http://schemas.openxmlformats.org/drawingml/2006/main" xmlns:r="http://schemas.openxmlformats.org/officeDocument/2006/relationships" xmlns:p="http://schemas.openxmlformats.org/presentationml/2006/main">
+  <p:cSld>
+    <p:spTree>
+      <p:nvGrpSpPr>
+        <p:cNvPr id="1" name=""/>
+        <p:cNvGrpSpPr/>
+        <p:nvPr/>
+      </p:nvGrpSpPr>
+      <p:grpSpPr>
+        <a:xfrm>
+          <a:off x="0" y="0"/>
+          <a:ext cx="0" cy="0"/>
+          <a:chOff x="0" y="0"/>
+          <a:chExt cx="0" cy="0"/>
+        </a:xfrm>
+      </p:grpSpPr>
+      <p:sp>
+        <p:nvSpPr>
+          <p:cNvPr id="4" name="TextBox 3"/>
+          <p:cNvSpPr txBox="1"/>
+          <p:nvPr/>
+        </p:nvSpPr>
+        <p:spPr>
+          <a:xfrm>
+            <a:off x="2915816" y="503401"/>
+            <a:ext cx="3070071" cy="523220"/>
+          </a:xfrm>
+          <a:prstGeom prst="rect">
+            <a:avLst/>
+          </a:prstGeom>
+          <a:noFill/>
+        </p:spPr>
+        <p:txBody>
+          <a:bodyPr wrap="none" rtlCol="0">
+            <a:spAutoFit/>
+          </a:bodyPr>
+          <a:lstStyle/>
+          <a:p>
+            <a:r>
+              <a:rPr lang="zh-CN" altLang="en-US" sz="2800" b="1" dirty="0" smtClean="0"/>
+              <a:t>应用容器日志管理</a:t>
+            </a:r>
+            <a:endParaRPr lang="zh-CN" altLang="en-US" sz="2800" b="1" dirty="0"/>
+          </a:p>
+        </p:txBody>
+      </p:sp>
+      <p:sp>
+        <p:nvSpPr>
+          <p:cNvPr id="5" name="TextBox 4"/>
+          <p:cNvSpPr txBox="1"/>
+          <p:nvPr/>
+        </p:nvSpPr>
+        <p:spPr>
+          <a:xfrm>
+            <a:off x="683568" y="1412776"/>
+            <a:ext cx="8486298" cy="4801314"/>
+          </a:xfrm>
+          <a:prstGeom prst="rect">
+            <a:avLst/>
+          </a:prstGeom>
+          <a:noFill/>
+        </p:spPr>
+        <p:txBody>
+          <a:bodyPr wrap="none" rtlCol="0">
+            <a:spAutoFit/>
+          </a:bodyPr>
+          <a:lstStyle/>
+          <a:p>
+            <a:r>
+              <a:rPr lang="zh-CN" altLang="en-US" b="1" dirty="0" smtClean="0"/>
+              <a:t>一个容器的日志可以分为：</a:t>
+            </a:r>
+            <a:endParaRPr lang="en-US" altLang="zh-CN" b="1" dirty="0" smtClean="0"/>
+          </a:p>
+          <a:p>
+            <a:r>
+              <a:rPr lang="en-US" altLang="zh-CN" dirty="0"/>
+              <a:t> </a:t>
+            </a:r>
+            <a:r>
+              <a:rPr lang="en-US" altLang="zh-CN" dirty="0" smtClean="0"/>
+              <a:t>1  </a:t>
+            </a:r>
+            <a:r>
+              <a:rPr lang="zh-CN" altLang="en-US" dirty="0" smtClean="0"/>
+              <a:t>容器本身运行日志     </a:t>
+            </a:r>
+            <a:r>
+              <a:rPr lang="en-US" altLang="zh-CN" dirty="0" err="1" smtClean="0"/>
+              <a:t>stdout</a:t>
+            </a:r>
+            <a:r>
+              <a:rPr lang="en-US" altLang="zh-CN" dirty="0" smtClean="0"/>
+              <a:t> </a:t>
+            </a:r>
+            <a:r>
+              <a:rPr lang="zh-CN" altLang="en-US" dirty="0" smtClean="0"/>
+              <a:t>记录</a:t>
+            </a:r>
+            <a:endParaRPr lang="en-US" altLang="zh-CN" dirty="0" smtClean="0"/>
+          </a:p>
+          <a:p>
+            <a:r>
+              <a:rPr lang="en-US" altLang="zh-CN" dirty="0"/>
+              <a:t> </a:t>
+            </a:r>
+            <a:r>
+              <a:rPr lang="en-US" altLang="zh-CN" dirty="0" smtClean="0"/>
+              <a:t>2  </a:t>
+            </a:r>
+            <a:r>
+              <a:rPr lang="zh-CN" altLang="en-US" dirty="0" smtClean="0"/>
+              <a:t>容器内服务的运行日志    </a:t>
+            </a:r>
+            <a:r>
+              <a:rPr lang="en-US" altLang="zh-CN" dirty="0" smtClean="0"/>
+              <a:t>file </a:t>
+            </a:r>
+            <a:r>
+              <a:rPr lang="zh-CN" altLang="en-US" dirty="0" smtClean="0"/>
+              <a:t>记录</a:t>
+            </a:r>
+            <a:endParaRPr lang="en-US" altLang="zh-CN" dirty="0" smtClean="0"/>
+          </a:p>
+          <a:p>
+            <a:endParaRPr lang="en-US" altLang="zh-CN" b="1" dirty="0"/>
+          </a:p>
+          <a:p>
+            <a:r>
+              <a:rPr lang="zh-CN" altLang="en-US" b="1" dirty="0" smtClean="0"/>
+              <a:t>日志可以有两个去向：</a:t>
+            </a:r>
+            <a:endParaRPr lang="en-US" altLang="zh-CN" b="1" dirty="0" smtClean="0"/>
+          </a:p>
+          <a:p>
+            <a:endParaRPr lang="en-US" altLang="zh-CN" b="1" dirty="0" smtClean="0"/>
+          </a:p>
+          <a:p>
+            <a:pPr marL="285750" indent="-285750">
+              <a:buFont typeface="Wingdings" pitchFamily="2" charset="2"/>
+              <a:buChar char="l"/>
+            </a:pPr>
+            <a:r>
+              <a:rPr lang="zh-CN" altLang="en-US" dirty="0"/>
+              <a:t>标准输出</a:t>
+            </a:r>
+            <a:r>
+              <a:rPr lang="en-US" altLang="zh-CN" dirty="0" err="1"/>
+              <a:t>stdout</a:t>
+            </a:r>
+            <a:r>
+              <a:rPr lang="zh-CN" altLang="en-US" dirty="0"/>
+              <a:t>到主机</a:t>
+            </a:r>
+            <a:r>
+              <a:rPr lang="en-US" altLang="zh-CN" dirty="0"/>
+              <a:t>/</a:t>
+            </a:r>
+            <a:r>
+              <a:rPr lang="en-US" altLang="zh-CN" dirty="0" err="1" smtClean="0"/>
+              <a:t>var</a:t>
+            </a:r>
+            <a:r>
+              <a:rPr lang="en-US" altLang="zh-CN" dirty="0" smtClean="0"/>
+              <a:t>/lib/</a:t>
+            </a:r>
+            <a:r>
+              <a:rPr lang="en-US" altLang="zh-CN" dirty="0" err="1" smtClean="0"/>
+              <a:t>docker</a:t>
+            </a:r>
+            <a:r>
+              <a:rPr lang="en-US" altLang="zh-CN" dirty="0" smtClean="0"/>
+              <a:t>/containers/</a:t>
+            </a:r>
+            <a:r>
+              <a:rPr lang="en-US" altLang="zh-CN" dirty="0" err="1" smtClean="0"/>
+              <a:t>container_ID</a:t>
+            </a:r>
+            <a:r>
+              <a:rPr lang="en-US" altLang="zh-CN" dirty="0" smtClean="0"/>
+              <a:t>/ID-json.log</a:t>
+            </a:r>
+            <a:r>
+              <a:rPr lang="zh-CN" altLang="en-US" dirty="0"/>
+              <a:t>文件中</a:t>
+            </a:r>
+            <a:r>
+              <a:rPr lang="zh-CN" altLang="en-US" dirty="0" smtClean="0"/>
+              <a:t>，</a:t>
+            </a:r>
+            <a:endParaRPr lang="en-US" altLang="zh-CN" dirty="0" smtClean="0"/>
+          </a:p>
+          <a:p>
+            <a:r>
+              <a:rPr lang="en-US" altLang="zh-CN" dirty="0" smtClean="0"/>
+              <a:t>       ID</a:t>
+            </a:r>
+            <a:r>
+              <a:rPr lang="zh-CN" altLang="en-US" dirty="0" smtClean="0"/>
+              <a:t>是应用容器的</a:t>
+            </a:r>
+            <a:r>
+              <a:rPr lang="en-US" altLang="zh-CN" dirty="0" smtClean="0"/>
+              <a:t>id</a:t>
+            </a:r>
+            <a:r>
+              <a:rPr lang="zh-CN" altLang="en-US" dirty="0" smtClean="0"/>
+              <a:t>，写</a:t>
+            </a:r>
+            <a:r>
+              <a:rPr lang="zh-CN" altLang="en-US" dirty="0"/>
+              <a:t>日志到磁盘文件</a:t>
+            </a:r>
+            <a:r>
+              <a:rPr lang="zh-CN" altLang="en-US" dirty="0" smtClean="0"/>
+              <a:t>。</a:t>
+            </a:r>
+            <a:endParaRPr lang="en-US" altLang="zh-CN" dirty="0" smtClean="0"/>
+          </a:p>
+          <a:p>
+            <a:endParaRPr lang="en-US" altLang="zh-CN" dirty="0"/>
+          </a:p>
+          <a:p>
+            <a:endParaRPr lang="en-US" altLang="zh-CN" dirty="0" smtClean="0"/>
+          </a:p>
+          <a:p>
+            <a:pPr marL="285750" indent="-285750">
+              <a:buFont typeface="Wingdings" pitchFamily="2" charset="2"/>
+              <a:buChar char="l"/>
+            </a:pPr>
+            <a:r>
+              <a:rPr lang="zh-CN" altLang="en-US" dirty="0" smtClean="0"/>
+              <a:t>标准输出重定向到文件，如</a:t>
+            </a:r>
+            <a:r>
+              <a:rPr lang="en-US" altLang="zh-CN" dirty="0" smtClean="0"/>
+              <a:t>java</a:t>
+            </a:r>
+            <a:r>
+              <a:rPr lang="zh-CN" altLang="en-US" dirty="0" smtClean="0"/>
+              <a:t>应用使用</a:t>
+            </a:r>
+            <a:r>
+              <a:rPr lang="en-US" altLang="zh-CN" dirty="0" smtClean="0"/>
+              <a:t>log4j </a:t>
+            </a:r>
+            <a:r>
+              <a:rPr lang="zh-CN" altLang="en-US" dirty="0" smtClean="0"/>
+              <a:t>管理</a:t>
+            </a:r>
+            <a:endParaRPr lang="en-US" altLang="zh-CN" dirty="0" smtClean="0"/>
+          </a:p>
+          <a:p>
+            <a:endParaRPr lang="en-US" altLang="zh-CN" dirty="0"/>
+          </a:p>
+          <a:p>
+            <a:r>
+              <a:rPr lang="zh-CN" altLang="en-US" dirty="0" smtClean="0"/>
+              <a:t>一台主机上多个相同应用实例，通常会把日志挂载到主机上，而容器内部的应用</a:t>
+            </a:r>
+            <a:endParaRPr lang="en-US" altLang="zh-CN" dirty="0" smtClean="0"/>
+          </a:p>
+          <a:p>
+            <a:r>
+              <a:rPr lang="zh-CN" altLang="en-US" dirty="0" smtClean="0"/>
+              <a:t>服务写日志文件时，日志文件必须可区分，最好是加上容器名前缀，如：</a:t>
+            </a:r>
+            <a:endParaRPr lang="en-US" altLang="zh-CN" dirty="0" smtClean="0"/>
+          </a:p>
+          <a:p>
+            <a:r>
+              <a:rPr lang="en-US" altLang="zh-CN" dirty="0" smtClean="0"/>
+              <a:t>firecloud01.catalina.out</a:t>
+            </a:r>
+          </a:p>
+          <a:p>
+            <a:r>
+              <a:rPr lang="en-US" altLang="zh-CN" dirty="0" smtClean="0"/>
+              <a:t>firecloud02.catalina.out</a:t>
+            </a:r>
+          </a:p>
+          <a:p>
+            <a:r>
+              <a:rPr lang="zh-CN" altLang="en-US" dirty="0" smtClean="0">
+                <a:solidFill>
+                  <a:srgbClr val="FF0000"/>
+                </a:solidFill>
+              </a:rPr>
+              <a:t>容器名必须以环境变量传进容器，以便</a:t>
+            </a:r>
+            <a:r>
+              <a:rPr lang="en-US" altLang="zh-CN" dirty="0" smtClean="0">
+                <a:solidFill>
+                  <a:srgbClr val="FF0000"/>
+                </a:solidFill>
+              </a:rPr>
+              <a:t>java</a:t>
+            </a:r>
+            <a:r>
+              <a:rPr lang="zh-CN" altLang="en-US" dirty="0" smtClean="0">
+                <a:solidFill>
+                  <a:srgbClr val="FF0000"/>
+                </a:solidFill>
+              </a:rPr>
+              <a:t>应用使用</a:t>
+            </a:r>
+            <a:endParaRPr lang="zh-CN" altLang="en-US" dirty="0">
+              <a:solidFill>
+                <a:srgbClr val="FF0000"/>
+              </a:solidFill>
+            </a:endParaRPr>
+          </a:p>
+        </p:txBody>
+      </p:sp>
+    </p:spTree>
+    <p:extLst>
+      <p:ext uri="{BB962C8B-B14F-4D97-AF65-F5344CB8AC3E}">
+        <p14:creationId xmlns:p14="http://schemas.microsoft.com/office/powerpoint/2010/main" val="3760740350"/>
+      </p:ext>
+    </p:extLst>
+  </p:cSld>
+  <p:clrMapOvr>
+    <a:masterClrMapping/>
+  </p:clrMapOvr>
+</p:sld>
+</file>
+
 <file path=ppt/theme/theme1.xml><?xml version="1.0" encoding="utf-8"?>
 <a:theme xmlns:a="http://schemas.openxmlformats.org/drawingml/2006/main" name="Office 主题">
   <a:themeElements>

</xml_diff>

<commit_message>
modify asset manage menu layer
</commit_message>
<xml_diff>
--- a/description/firecloud-architecture.pptx
+++ b/description/firecloud-architecture.pptx
@@ -275,7 +275,7 @@
           <a:p>
             <a:fld id="{3B2F3DAA-A607-4D45-BFE1-82523F5BE566}" type="datetimeFigureOut">
               <a:rPr lang="en-US" smtClean="0"/>
-              <a:t>2/27/2019</a:t>
+              <a:t>3/7/2019</a:t>
             </a:fld>
             <a:endParaRPr lang="en-US"/>
           </a:p>
@@ -724,7 +724,7 @@
           <a:p>
             <a:fld id="{530820CF-B880-4189-942D-D702A7CBA730}" type="datetimeFigureOut">
               <a:rPr lang="zh-CN" altLang="en-US" smtClean="0"/>
-              <a:t>2019/2/18</a:t>
+              <a:t>2019/3/7</a:t>
             </a:fld>
             <a:endParaRPr lang="zh-CN" altLang="en-US"/>
           </a:p>
@@ -889,7 +889,7 @@
           <a:p>
             <a:fld id="{530820CF-B880-4189-942D-D702A7CBA730}" type="datetimeFigureOut">
               <a:rPr lang="zh-CN" altLang="en-US" smtClean="0"/>
-              <a:t>2019/2/18</a:t>
+              <a:t>2019/3/7</a:t>
             </a:fld>
             <a:endParaRPr lang="zh-CN" altLang="en-US"/>
           </a:p>
@@ -1064,7 +1064,7 @@
           <a:p>
             <a:fld id="{530820CF-B880-4189-942D-D702A7CBA730}" type="datetimeFigureOut">
               <a:rPr lang="zh-CN" altLang="en-US" smtClean="0"/>
-              <a:t>2019/2/18</a:t>
+              <a:t>2019/3/7</a:t>
             </a:fld>
             <a:endParaRPr lang="zh-CN" altLang="en-US"/>
           </a:p>
@@ -1229,7 +1229,7 @@
           <a:p>
             <a:fld id="{530820CF-B880-4189-942D-D702A7CBA730}" type="datetimeFigureOut">
               <a:rPr lang="zh-CN" altLang="en-US" smtClean="0"/>
-              <a:t>2019/2/18</a:t>
+              <a:t>2019/3/7</a:t>
             </a:fld>
             <a:endParaRPr lang="zh-CN" altLang="en-US"/>
           </a:p>
@@ -1470,7 +1470,7 @@
           <a:p>
             <a:fld id="{530820CF-B880-4189-942D-D702A7CBA730}" type="datetimeFigureOut">
               <a:rPr lang="zh-CN" altLang="en-US" smtClean="0"/>
-              <a:t>2019/2/18</a:t>
+              <a:t>2019/3/7</a:t>
             </a:fld>
             <a:endParaRPr lang="zh-CN" altLang="en-US"/>
           </a:p>
@@ -1753,7 +1753,7 @@
           <a:p>
             <a:fld id="{530820CF-B880-4189-942D-D702A7CBA730}" type="datetimeFigureOut">
               <a:rPr lang="zh-CN" altLang="en-US" smtClean="0"/>
-              <a:t>2019/2/18</a:t>
+              <a:t>2019/3/7</a:t>
             </a:fld>
             <a:endParaRPr lang="zh-CN" altLang="en-US"/>
           </a:p>
@@ -2170,7 +2170,7 @@
           <a:p>
             <a:fld id="{530820CF-B880-4189-942D-D702A7CBA730}" type="datetimeFigureOut">
               <a:rPr lang="zh-CN" altLang="en-US" smtClean="0"/>
-              <a:t>2019/2/18</a:t>
+              <a:t>2019/3/7</a:t>
             </a:fld>
             <a:endParaRPr lang="zh-CN" altLang="en-US"/>
           </a:p>
@@ -2283,7 +2283,7 @@
           <a:p>
             <a:fld id="{530820CF-B880-4189-942D-D702A7CBA730}" type="datetimeFigureOut">
               <a:rPr lang="zh-CN" altLang="en-US" smtClean="0"/>
-              <a:t>2019/2/18</a:t>
+              <a:t>2019/3/7</a:t>
             </a:fld>
             <a:endParaRPr lang="zh-CN" altLang="en-US"/>
           </a:p>
@@ -2373,7 +2373,7 @@
           <a:p>
             <a:fld id="{530820CF-B880-4189-942D-D702A7CBA730}" type="datetimeFigureOut">
               <a:rPr lang="zh-CN" altLang="en-US" smtClean="0"/>
-              <a:t>2019/2/18</a:t>
+              <a:t>2019/3/7</a:t>
             </a:fld>
             <a:endParaRPr lang="zh-CN" altLang="en-US"/>
           </a:p>
@@ -2645,7 +2645,7 @@
           <a:p>
             <a:fld id="{530820CF-B880-4189-942D-D702A7CBA730}" type="datetimeFigureOut">
               <a:rPr lang="zh-CN" altLang="en-US" smtClean="0"/>
-              <a:t>2019/2/18</a:t>
+              <a:t>2019/3/7</a:t>
             </a:fld>
             <a:endParaRPr lang="zh-CN" altLang="en-US"/>
           </a:p>
@@ -2893,7 +2893,7 @@
           <a:p>
             <a:fld id="{530820CF-B880-4189-942D-D702A7CBA730}" type="datetimeFigureOut">
               <a:rPr lang="zh-CN" altLang="en-US" smtClean="0"/>
-              <a:t>2019/2/18</a:t>
+              <a:t>2019/3/7</a:t>
             </a:fld>
             <a:endParaRPr lang="zh-CN" altLang="en-US"/>
           </a:p>
@@ -3101,7 +3101,7 @@
           <a:p>
             <a:fld id="{530820CF-B880-4189-942D-D702A7CBA730}" type="datetimeFigureOut">
               <a:rPr lang="zh-CN" altLang="en-US" smtClean="0"/>
-              <a:t>2019/2/18</a:t>
+              <a:t>2019/3/7</a:t>
             </a:fld>
             <a:endParaRPr lang="zh-CN" altLang="en-US"/>
           </a:p>
@@ -6805,7 +6805,6 @@
               <a:rPr lang="en-US" sz="2400" dirty="0" smtClean="0"/>
               <a:t>Follower</a:t>
             </a:r>
-            <a:endParaRPr lang="en-US" sz="2400" dirty="0" smtClean="0"/>
           </a:p>
         </p:txBody>
       </p:sp>
@@ -7027,7 +7026,6 @@
               <a:rPr lang="en-US" altLang="zh-CN" sz="1600" dirty="0" smtClean="0"/>
               <a:t>)</a:t>
             </a:r>
-            <a:endParaRPr lang="en-US" altLang="zh-CN" sz="1600" dirty="0" smtClean="0"/>
           </a:p>
           <a:p>
             <a:pPr marL="285750" indent="-285750">
@@ -7091,11 +7089,7 @@
             </a:r>
             <a:r>
               <a:rPr lang="zh-CN" altLang="en-US" dirty="0" smtClean="0"/>
-              <a:t>信</a:t>
-            </a:r>
-            <a:r>
-              <a:rPr lang="zh-CN" altLang="en-US" dirty="0" smtClean="0"/>
-              <a:t>息</a:t>
+              <a:t>信息</a:t>
             </a:r>
             <a:endParaRPr lang="en-US" altLang="zh-CN" dirty="0" smtClean="0"/>
           </a:p>
@@ -8460,14 +8454,14 @@
           <p:nvPr>
             <p:extLst>
               <p:ext uri="{D42A27DB-BD31-4B8C-83A1-F6EECF244321}">
-                <p14:modId xmlns:p14="http://schemas.microsoft.com/office/powerpoint/2010/main" val="85200530"/>
+                <p14:modId xmlns:p14="http://schemas.microsoft.com/office/powerpoint/2010/main" val="3672443715"/>
               </p:ext>
             </p:extLst>
           </p:nvPr>
         </p:nvGraphicFramePr>
         <p:xfrm>
           <a:off x="296888" y="2537475"/>
-          <a:ext cx="8706941" cy="3261002"/>
+          <a:ext cx="8706941" cy="3662206"/>
         </p:xfrm>
         <a:graphic>
           <a:graphicData uri="http://schemas.openxmlformats.org/drawingml/2006/table">
@@ -8864,7 +8858,7 @@
                 </a:tc>
               </a:tr>
               <a:tr h="401204">
-                <a:tc rowSpan="3">
+                <a:tc rowSpan="4">
                   <a:txBody>
                     <a:bodyPr/>
                     <a:lstStyle/>
@@ -9090,7 +9084,6 @@
                         <a:rPr lang="en-US" sz="1600" dirty="0" smtClean="0"/>
                         <a:t>Status</a:t>
                       </a:r>
-                      <a:endParaRPr lang="en-US" sz="1600" dirty="0" smtClean="0"/>
                     </a:p>
                   </a:txBody>
                   <a:tcPr/>
@@ -9136,6 +9129,94 @@
                   <a:tcPr/>
                 </a:tc>
               </a:tr>
+              <a:tr h="401204">
+                <a:tc vMerge="1">
+                  <a:txBody>
+                    <a:bodyPr/>
+                    <a:lstStyle/>
+                    <a:p>
+                      <a:pPr marL="0" marR="0" indent="0" algn="ctr" defTabSz="914400" rtl="0" eaLnBrk="1" fontAlgn="auto" latinLnBrk="0" hangingPunct="1">
+                        <a:lnSpc>
+                          <a:spcPct val="100000"/>
+                        </a:lnSpc>
+                        <a:spcBef>
+                          <a:spcPts val="0"/>
+                        </a:spcBef>
+                        <a:spcAft>
+                          <a:spcPts val="0"/>
+                        </a:spcAft>
+                        <a:buClrTx/>
+                        <a:buSzTx/>
+                        <a:buFontTx/>
+                        <a:buNone/>
+                        <a:tabLst/>
+                        <a:defRPr/>
+                      </a:pPr>
+                      <a:endParaRPr lang="en-US" sz="1600" dirty="0" smtClean="0"/>
+                    </a:p>
+                  </a:txBody>
+                  <a:tcPr/>
+                </a:tc>
+                <a:tc>
+                  <a:txBody>
+                    <a:bodyPr/>
+                    <a:lstStyle/>
+                    <a:p>
+                      <a:pPr marL="0" marR="0" indent="0" algn="l" defTabSz="914400" rtl="0" eaLnBrk="1" fontAlgn="auto" latinLnBrk="0" hangingPunct="1">
+                        <a:lnSpc>
+                          <a:spcPct val="100000"/>
+                        </a:lnSpc>
+                        <a:spcBef>
+                          <a:spcPts val="0"/>
+                        </a:spcBef>
+                        <a:spcAft>
+                          <a:spcPts val="0"/>
+                        </a:spcAft>
+                        <a:buClrTx/>
+                        <a:buSzTx/>
+                        <a:buFontTx/>
+                        <a:buNone/>
+                        <a:tabLst/>
+                        <a:defRPr/>
+                      </a:pPr>
+                      <a:r>
+                        <a:rPr lang="en-US" altLang="zh-CN" sz="1600" dirty="0" smtClean="0"/>
+                        <a:t>Name</a:t>
+                      </a:r>
+                      <a:endParaRPr lang="en-US" sz="1600" dirty="0" smtClean="0"/>
+                    </a:p>
+                  </a:txBody>
+                  <a:tcPr/>
+                </a:tc>
+                <a:tc>
+                  <a:txBody>
+                    <a:bodyPr/>
+                    <a:lstStyle/>
+                    <a:p>
+                      <a:r>
+                        <a:rPr lang="en-US" sz="1600" dirty="0" err="1" smtClean="0"/>
+                        <a:t>Firecloud</a:t>
+                      </a:r>
+                      <a:endParaRPr lang="en-US" sz="1600" dirty="0"/>
+                    </a:p>
+                  </a:txBody>
+                  <a:tcPr/>
+                </a:tc>
+                <a:tc>
+                  <a:txBody>
+                    <a:bodyPr/>
+                    <a:lstStyle/>
+                    <a:p>
+                      <a:r>
+                        <a:rPr lang="zh-CN" altLang="en-US" sz="1600" smtClean="0"/>
+                        <a:t>集群名</a:t>
+                      </a:r>
+                      <a:endParaRPr lang="en-US" sz="1600" dirty="0"/>
+                    </a:p>
+                  </a:txBody>
+                  <a:tcPr/>
+                </a:tc>
+              </a:tr>
             </a:tbl>
           </a:graphicData>
         </a:graphic>
@@ -9202,11 +9283,7 @@
             </a:r>
             <a:r>
               <a:rPr lang="en-US" altLang="zh-CN" sz="2800" b="1" dirty="0" smtClean="0"/>
-              <a:t>– </a:t>
-            </a:r>
-            <a:r>
-              <a:rPr lang="en-US" altLang="zh-CN" sz="2800" b="1" dirty="0" smtClean="0"/>
-              <a:t>Agent</a:t>
+              <a:t>– Agent</a:t>
             </a:r>
             <a:r>
               <a:rPr lang="zh-CN" altLang="en-US" sz="2800" b="1" dirty="0" smtClean="0"/>
@@ -9271,7 +9348,6 @@
               <a:rPr lang="en-US" dirty="0" smtClean="0"/>
               <a:t> }</a:t>
             </a:r>
-            <a:endParaRPr lang="en-US" dirty="0" smtClean="0"/>
           </a:p>
           <a:p>
             <a:r>
@@ -9291,7 +9367,7 @@
           <p:nvPr>
             <p:extLst>
               <p:ext uri="{D42A27DB-BD31-4B8C-83A1-F6EECF244321}">
-                <p14:modId xmlns:p14="http://schemas.microsoft.com/office/powerpoint/2010/main" val="318994395"/>
+                <p14:modId xmlns:p14="http://schemas.microsoft.com/office/powerpoint/2010/main" val="549585377"/>
               </p:ext>
             </p:extLst>
           </p:nvPr>
@@ -9429,7 +9505,7 @@
                     <a:p>
                       <a:r>
                         <a:rPr lang="en-US" sz="1600" dirty="0" smtClean="0"/>
-                        <a:t>192.168.10.1:9001</a:t>
+                        <a:t>192.168.10.1</a:t>
                       </a:r>
                       <a:endParaRPr lang="en-US" sz="1600" dirty="0"/>
                     </a:p>
@@ -9478,7 +9554,6 @@
                         <a:rPr lang="en-US" sz="1600" dirty="0" smtClean="0"/>
                         <a:t>Port</a:t>
                       </a:r>
-                      <a:endParaRPr lang="en-US" sz="1600" dirty="0" smtClean="0"/>
                     </a:p>
                   </a:txBody>
                   <a:tcPr/>
@@ -9504,11 +9579,7 @@
                     <a:p>
                       <a:r>
                         <a:rPr lang="zh-CN" altLang="en-US" sz="1600" dirty="0" smtClean="0"/>
-                        <a:t>节</a:t>
-                      </a:r>
-                      <a:r>
-                        <a:rPr lang="zh-CN" altLang="en-US" sz="1600" dirty="0" smtClean="0"/>
-                        <a:t>点端口</a:t>
+                        <a:t>节点端口</a:t>
                       </a:r>
                       <a:endParaRPr lang="en-US" sz="1600" dirty="0"/>
                     </a:p>
@@ -9608,7 +9679,6 @@
                         <a:rPr lang="en-US" sz="1600" dirty="0" smtClean="0"/>
                         <a:t>egistered</a:t>
                       </a:r>
-                      <a:endParaRPr lang="en-US" sz="1600" dirty="0" smtClean="0"/>
                     </a:p>
                   </a:txBody>
                   <a:tcPr/>
@@ -9669,7 +9739,6 @@
                         <a:rPr lang="en-US" sz="1600" dirty="0" smtClean="0"/>
                         <a:t>Status</a:t>
                       </a:r>
-                      <a:endParaRPr lang="en-US" sz="1600" dirty="0" smtClean="0"/>
                     </a:p>
                   </a:txBody>
                   <a:tcPr/>
@@ -9715,6 +9784,56 @@
           </a:graphicData>
         </a:graphic>
       </p:graphicFrame>
+      <p:sp>
+        <p:nvSpPr>
+          <p:cNvPr id="2" name="TextBox 1"/>
+          <p:cNvSpPr txBox="1"/>
+          <p:nvPr/>
+        </p:nvSpPr>
+        <p:spPr>
+          <a:xfrm>
+            <a:off x="6012160" y="2020198"/>
+            <a:ext cx="2683683" cy="369332"/>
+          </a:xfrm>
+          <a:prstGeom prst="rect">
+            <a:avLst/>
+          </a:prstGeom>
+          <a:noFill/>
+        </p:spPr>
+        <p:txBody>
+          <a:bodyPr wrap="none" rtlCol="0">
+            <a:spAutoFit/>
+          </a:bodyPr>
+          <a:lstStyle/>
+          <a:p>
+            <a:r>
+              <a:rPr lang="zh-CN" altLang="en-US" dirty="0"/>
+              <a:t>根</a:t>
+            </a:r>
+            <a:r>
+              <a:rPr lang="zh-CN" altLang="en-US" dirty="0" smtClean="0"/>
+              <a:t>据</a:t>
+            </a:r>
+            <a:r>
+              <a:rPr lang="en-US" altLang="zh-CN" dirty="0" smtClean="0"/>
+              <a:t>MAC</a:t>
+            </a:r>
+            <a:r>
+              <a:rPr lang="zh-CN" altLang="en-US" dirty="0"/>
+              <a:t>地</a:t>
+            </a:r>
+            <a:r>
+              <a:rPr lang="zh-CN" altLang="en-US" dirty="0" smtClean="0"/>
+              <a:t>址生成节点</a:t>
+            </a:r>
+            <a:r>
+              <a:rPr lang="en-US" altLang="zh-CN" dirty="0" smtClean="0"/>
+              <a:t>ID</a:t>
+            </a:r>
+            <a:endParaRPr lang="en-US" dirty="0"/>
+          </a:p>
+        </p:txBody>
+      </p:sp>
     </p:spTree>
     <p:extLst>
       <p:ext uri="{BB962C8B-B14F-4D97-AF65-F5344CB8AC3E}">
@@ -13190,7 +13309,6 @@
               <a:rPr lang="en-US" dirty="0"/>
               <a:t>consistency</a:t>
             </a:r>
-            <a:endParaRPr lang="en-US" dirty="0"/>
           </a:p>
         </p:txBody>
       </p:sp>
@@ -13582,11 +13700,7 @@
             </a:r>
             <a:r>
               <a:rPr lang="zh-CN" altLang="en-US" sz="2800" b="1" dirty="0" smtClean="0"/>
-              <a:t>集</a:t>
-            </a:r>
-            <a:r>
-              <a:rPr lang="zh-CN" altLang="en-US" sz="2800" b="1" dirty="0" smtClean="0"/>
-              <a:t>群数据一致性过程</a:t>
+              <a:t>集群数据一致性过程</a:t>
             </a:r>
             <a:endParaRPr lang="zh-CN" altLang="en-US" sz="2800" b="1" dirty="0"/>
           </a:p>
@@ -13630,11 +13744,7 @@
             <a:pPr algn="ctr"/>
             <a:r>
               <a:rPr lang="zh-CN" altLang="en-US" dirty="0" smtClean="0"/>
-              <a:t>节</a:t>
-            </a:r>
-            <a:r>
-              <a:rPr lang="zh-CN" altLang="en-US" dirty="0" smtClean="0"/>
-              <a:t>点</a:t>
+              <a:t>节点</a:t>
             </a:r>
             <a:r>
               <a:rPr lang="en-US" altLang="zh-CN" dirty="0" smtClean="0"/>
@@ -14156,11 +14266,7 @@
             </a:r>
             <a:r>
               <a:rPr lang="en-US" altLang="zh-CN" sz="2800" b="1" dirty="0" smtClean="0"/>
-              <a:t>– </a:t>
-            </a:r>
-            <a:r>
-              <a:rPr lang="en-US" altLang="zh-CN" sz="2800" b="1" dirty="0" smtClean="0"/>
-              <a:t>TCP</a:t>
+              <a:t>– TCP</a:t>
             </a:r>
             <a:r>
               <a:rPr lang="zh-CN" altLang="en-US" sz="2800" b="1" dirty="0" smtClean="0"/>
@@ -14205,11 +14311,7 @@
             </a:r>
             <a:r>
               <a:rPr lang="en-US" altLang="zh-CN" dirty="0" smtClean="0"/>
-              <a:t>  </a:t>
-            </a:r>
-            <a:r>
-              <a:rPr lang="en-US" altLang="zh-CN" dirty="0" smtClean="0"/>
-              <a:t>1  TCP/IP </a:t>
+              <a:t>  1  TCP/IP </a:t>
             </a:r>
             <a:r>
               <a:rPr lang="zh-CN" altLang="en-US" dirty="0" smtClean="0"/>
@@ -14730,7 +14832,6 @@
               <a:rPr lang="zh-CN" altLang="en-US" sz="1600" dirty="0"/>
               <a:t>第一个包头和包体信息”部分即可。</a:t>
             </a:r>
-            <a:endParaRPr lang="zh-CN" altLang="en-US" sz="1600" dirty="0"/>
           </a:p>
           <a:p>
             <a:endParaRPr lang="en-US" altLang="zh-CN" dirty="0"/>
@@ -17790,11 +17891,7 @@
             </a:r>
             <a:r>
               <a:rPr lang="zh-CN" altLang="en-US" dirty="0" smtClean="0"/>
-              <a:t>：手动指定方</a:t>
-            </a:r>
-            <a:r>
-              <a:rPr lang="zh-CN" altLang="en-US" dirty="0" smtClean="0"/>
-              <a:t>式</a:t>
+              <a:t>：手动指定方式</a:t>
             </a:r>
             <a:r>
               <a:rPr lang="en-US" altLang="zh-CN" dirty="0" smtClean="0"/>
@@ -17946,11 +18043,7 @@
             </a:r>
             <a:r>
               <a:rPr lang="en-US" altLang="zh-CN" sz="2800" b="1" dirty="0" smtClean="0"/>
-              <a:t>– </a:t>
-            </a:r>
-            <a:r>
-              <a:rPr lang="en-US" altLang="zh-CN" sz="2800" b="1" dirty="0" smtClean="0"/>
-              <a:t>master</a:t>
+              <a:t>– master</a:t>
             </a:r>
             <a:r>
               <a:rPr lang="zh-CN" altLang="en-US" sz="2800" b="1" dirty="0" smtClean="0"/>
@@ -19966,19 +20059,11 @@
             </a:r>
             <a:r>
               <a:rPr lang="en-US" altLang="zh-CN" sz="2800" b="1" dirty="0" smtClean="0"/>
-              <a:t>-- master, </a:t>
-            </a:r>
-            <a:r>
-              <a:rPr lang="en-US" altLang="zh-CN" sz="2800" b="1" dirty="0" smtClean="0"/>
-              <a:t>agent</a:t>
+              <a:t>-- master, agent</a:t>
             </a:r>
             <a:r>
               <a:rPr lang="zh-CN" altLang="en-US" sz="2800" b="1" dirty="0" smtClean="0"/>
-              <a:t>交</a:t>
-            </a:r>
-            <a:r>
-              <a:rPr lang="zh-CN" altLang="en-US" sz="2800" b="1" dirty="0" smtClean="0"/>
-              <a:t>互</a:t>
+              <a:t>交互</a:t>
             </a:r>
             <a:r>
               <a:rPr lang="en-US" altLang="zh-CN" sz="2800" b="1" dirty="0" smtClean="0"/>
@@ -20462,19 +20547,11 @@
             </a:r>
             <a:r>
               <a:rPr lang="en-US" altLang="zh-CN" sz="2800" b="1" dirty="0" smtClean="0"/>
-              <a:t>-- master, </a:t>
-            </a:r>
-            <a:r>
-              <a:rPr lang="en-US" altLang="zh-CN" sz="2800" b="1" dirty="0" smtClean="0"/>
-              <a:t>agent</a:t>
+              <a:t>-- master, agent</a:t>
             </a:r>
             <a:r>
               <a:rPr lang="zh-CN" altLang="en-US" sz="2800" b="1" dirty="0" smtClean="0"/>
-              <a:t>交</a:t>
-            </a:r>
-            <a:r>
-              <a:rPr lang="zh-CN" altLang="en-US" sz="2800" b="1" dirty="0" smtClean="0"/>
-              <a:t>互</a:t>
+              <a:t>交互</a:t>
             </a:r>
             <a:r>
               <a:rPr lang="en-US" altLang="zh-CN" sz="2800" b="1" dirty="0" smtClean="0"/>

</xml_diff>